<commit_message>
fix before new commit
</commit_message>
<xml_diff>
--- a/IPVC-EI-TEMPLATE-PPT-IS-A_ADAPTAR_v1.pptx
+++ b/IPVC-EI-TEMPLATE-PPT-IS-A_ADAPTAR_v1.pptx
@@ -5,18 +5,21 @@
     <p:sldMasterId id="2147483648" r:id="rId1"/>
   </p:sldMasterIdLst>
   <p:notesMasterIdLst>
-    <p:notesMasterId r:id="rId8"/>
+    <p:notesMasterId r:id="rId11"/>
   </p:notesMasterIdLst>
   <p:handoutMasterIdLst>
-    <p:handoutMasterId r:id="rId9"/>
+    <p:handoutMasterId r:id="rId12"/>
   </p:handoutMasterIdLst>
   <p:sldIdLst>
     <p:sldId id="309" r:id="rId2"/>
     <p:sldId id="258" r:id="rId3"/>
-    <p:sldId id="310" r:id="rId4"/>
-    <p:sldId id="278" r:id="rId5"/>
-    <p:sldId id="311" r:id="rId6"/>
-    <p:sldId id="260" r:id="rId7"/>
+    <p:sldId id="313" r:id="rId4"/>
+    <p:sldId id="314" r:id="rId5"/>
+    <p:sldId id="310" r:id="rId6"/>
+    <p:sldId id="312" r:id="rId7"/>
+    <p:sldId id="278" r:id="rId8"/>
+    <p:sldId id="311" r:id="rId9"/>
+    <p:sldId id="260" r:id="rId10"/>
   </p:sldIdLst>
   <p:sldSz cx="9144000" cy="6858000" type="screen4x3"/>
   <p:notesSz cx="7099300" cy="10234613"/>
@@ -217,7 +220,7 @@
             <a:fld id="{ADB6FF1F-555E-4388-A8B0-D1E524B355D1}" type="datetimeFigureOut">
               <a:rPr lang="pt-PT" smtClean="0"/>
               <a:pPr/>
-              <a:t>28/09/2023</a:t>
+              <a:t>01/10/2023</a:t>
             </a:fld>
             <a:endParaRPr lang="pt-PT"/>
           </a:p>
@@ -384,7 +387,7 @@
             <a:fld id="{E77E319B-B046-487F-8D03-B96E4F1A43D0}" type="datetimeFigureOut">
               <a:rPr lang="pt-PT" smtClean="0"/>
               <a:pPr/>
-              <a:t>28/09/2023</a:t>
+              <a:t>01/10/2023</a:t>
             </a:fld>
             <a:endParaRPr lang="pt-PT"/>
           </a:p>
@@ -842,7 +845,7 @@
     </p:spTree>
     <p:extLst>
       <p:ext uri="{BB962C8B-B14F-4D97-AF65-F5344CB8AC3E}">
-        <p14:creationId xmlns:p14="http://schemas.microsoft.com/office/powerpoint/2010/main" val="4123354819"/>
+        <p14:creationId xmlns:p14="http://schemas.microsoft.com/office/powerpoint/2010/main" val="3372684991"/>
       </p:ext>
     </p:extLst>
   </p:cSld>
@@ -932,19 +935,16 @@
           <a:lstStyle/>
           <a:p>
             <a:pPr eaLnBrk="1" hangingPunct="1"/>
-            <a:r>
-              <a:rPr lang="pt-PT" dirty="0">
-                <a:latin typeface="Arial" pitchFamily="34" charset="0"/>
-              </a:rPr>
-              <a:t>Tiago (acabar referencias)</a:t>
-            </a:r>
+            <a:endParaRPr lang="pt-PT">
+              <a:latin typeface="Arial" pitchFamily="34" charset="0"/>
+            </a:endParaRPr>
           </a:p>
         </p:txBody>
       </p:sp>
     </p:spTree>
     <p:extLst>
       <p:ext uri="{BB962C8B-B14F-4D97-AF65-F5344CB8AC3E}">
-        <p14:creationId xmlns:p14="http://schemas.microsoft.com/office/powerpoint/2010/main" val="931110731"/>
+        <p14:creationId xmlns:p14="http://schemas.microsoft.com/office/powerpoint/2010/main" val="786988176"/>
       </p:ext>
     </p:extLst>
   </p:cSld>
@@ -994,6 +994,306 @@
               </a:rPr>
               <a:pPr/>
               <a:t>5</a:t>
+            </a:fld>
+            <a:endParaRPr lang="pt-PT">
+              <a:latin typeface="Arial" pitchFamily="34" charset="0"/>
+            </a:endParaRPr>
+          </a:p>
+        </p:txBody>
+      </p:sp>
+      <p:sp>
+        <p:nvSpPr>
+          <p:cNvPr id="93187" name="Rectangle 2"/>
+          <p:cNvSpPr>
+            <a:spLocks noGrp="1" noRot="1" noChangeAspect="1" noChangeArrowheads="1" noTextEdit="1"/>
+          </p:cNvSpPr>
+          <p:nvPr>
+            <p:ph type="sldImg"/>
+          </p:nvPr>
+        </p:nvSpPr>
+        <p:spPr>
+          <a:ln/>
+        </p:spPr>
+      </p:sp>
+      <p:sp>
+        <p:nvSpPr>
+          <p:cNvPr id="93188" name="Rectangle 3"/>
+          <p:cNvSpPr>
+            <a:spLocks noGrp="1" noChangeArrowheads="1"/>
+          </p:cNvSpPr>
+          <p:nvPr>
+            <p:ph type="body" idx="1"/>
+          </p:nvPr>
+        </p:nvSpPr>
+        <p:spPr>
+          <a:noFill/>
+          <a:ln/>
+        </p:spPr>
+        <p:txBody>
+          <a:bodyPr/>
+          <a:lstStyle/>
+          <a:p>
+            <a:pPr eaLnBrk="1" hangingPunct="1"/>
+            <a:endParaRPr lang="pt-PT">
+              <a:latin typeface="Arial" pitchFamily="34" charset="0"/>
+            </a:endParaRPr>
+          </a:p>
+        </p:txBody>
+      </p:sp>
+    </p:spTree>
+    <p:extLst>
+      <p:ext uri="{BB962C8B-B14F-4D97-AF65-F5344CB8AC3E}">
+        <p14:creationId xmlns:p14="http://schemas.microsoft.com/office/powerpoint/2010/main" val="4123354819"/>
+      </p:ext>
+    </p:extLst>
+  </p:cSld>
+  <p:clrMapOvr>
+    <a:masterClrMapping/>
+  </p:clrMapOvr>
+</p:notes>
+</file>
+
+<file path=ppt/notesSlides/notesSlide5.xml><?xml version="1.0" encoding="utf-8"?>
+<p:notes xmlns:a="http://schemas.openxmlformats.org/drawingml/2006/main" xmlns:r="http://schemas.openxmlformats.org/officeDocument/2006/relationships" xmlns:p="http://schemas.openxmlformats.org/presentationml/2006/main">
+  <p:cSld>
+    <p:spTree>
+      <p:nvGrpSpPr>
+        <p:cNvPr id="1" name=""/>
+        <p:cNvGrpSpPr/>
+        <p:nvPr/>
+      </p:nvGrpSpPr>
+      <p:grpSpPr>
+        <a:xfrm>
+          <a:off x="0" y="0"/>
+          <a:ext cx="0" cy="0"/>
+          <a:chOff x="0" y="0"/>
+          <a:chExt cx="0" cy="0"/>
+        </a:xfrm>
+      </p:grpSpPr>
+      <p:sp>
+        <p:nvSpPr>
+          <p:cNvPr id="93186" name="Rectangle 7"/>
+          <p:cNvSpPr>
+            <a:spLocks noGrp="1" noChangeArrowheads="1"/>
+          </p:cNvSpPr>
+          <p:nvPr>
+            <p:ph type="sldNum" sz="quarter" idx="5"/>
+          </p:nvPr>
+        </p:nvSpPr>
+        <p:spPr>
+          <a:noFill/>
+        </p:spPr>
+        <p:txBody>
+          <a:bodyPr/>
+          <a:lstStyle/>
+          <a:p>
+            <a:fld id="{497D1F5F-AB60-452E-AA79-64E25350F70B}" type="slidenum">
+              <a:rPr lang="pt-PT" smtClean="0">
+                <a:latin typeface="Arial" pitchFamily="34" charset="0"/>
+              </a:rPr>
+              <a:pPr/>
+              <a:t>6</a:t>
+            </a:fld>
+            <a:endParaRPr lang="pt-PT">
+              <a:latin typeface="Arial" pitchFamily="34" charset="0"/>
+            </a:endParaRPr>
+          </a:p>
+        </p:txBody>
+      </p:sp>
+      <p:sp>
+        <p:nvSpPr>
+          <p:cNvPr id="93187" name="Rectangle 2"/>
+          <p:cNvSpPr>
+            <a:spLocks noGrp="1" noRot="1" noChangeAspect="1" noChangeArrowheads="1" noTextEdit="1"/>
+          </p:cNvSpPr>
+          <p:nvPr>
+            <p:ph type="sldImg"/>
+          </p:nvPr>
+        </p:nvSpPr>
+        <p:spPr>
+          <a:ln/>
+        </p:spPr>
+      </p:sp>
+      <p:sp>
+        <p:nvSpPr>
+          <p:cNvPr id="93188" name="Rectangle 3"/>
+          <p:cNvSpPr>
+            <a:spLocks noGrp="1" noChangeArrowheads="1"/>
+          </p:cNvSpPr>
+          <p:nvPr>
+            <p:ph type="body" idx="1"/>
+          </p:nvPr>
+        </p:nvSpPr>
+        <p:spPr>
+          <a:noFill/>
+          <a:ln/>
+        </p:spPr>
+        <p:txBody>
+          <a:bodyPr/>
+          <a:lstStyle/>
+          <a:p>
+            <a:pPr eaLnBrk="1" hangingPunct="1"/>
+            <a:endParaRPr lang="pt-PT">
+              <a:latin typeface="Arial" pitchFamily="34" charset="0"/>
+            </a:endParaRPr>
+          </a:p>
+        </p:txBody>
+      </p:sp>
+    </p:spTree>
+    <p:extLst>
+      <p:ext uri="{BB962C8B-B14F-4D97-AF65-F5344CB8AC3E}">
+        <p14:creationId xmlns:p14="http://schemas.microsoft.com/office/powerpoint/2010/main" val="2245694656"/>
+      </p:ext>
+    </p:extLst>
+  </p:cSld>
+  <p:clrMapOvr>
+    <a:masterClrMapping/>
+  </p:clrMapOvr>
+</p:notes>
+</file>
+
+<file path=ppt/notesSlides/notesSlide6.xml><?xml version="1.0" encoding="utf-8"?>
+<p:notes xmlns:a="http://schemas.openxmlformats.org/drawingml/2006/main" xmlns:r="http://schemas.openxmlformats.org/officeDocument/2006/relationships" xmlns:p="http://schemas.openxmlformats.org/presentationml/2006/main">
+  <p:cSld>
+    <p:spTree>
+      <p:nvGrpSpPr>
+        <p:cNvPr id="1" name=""/>
+        <p:cNvGrpSpPr/>
+        <p:nvPr/>
+      </p:nvGrpSpPr>
+      <p:grpSpPr>
+        <a:xfrm>
+          <a:off x="0" y="0"/>
+          <a:ext cx="0" cy="0"/>
+          <a:chOff x="0" y="0"/>
+          <a:chExt cx="0" cy="0"/>
+        </a:xfrm>
+      </p:grpSpPr>
+      <p:sp>
+        <p:nvSpPr>
+          <p:cNvPr id="93186" name="Rectangle 7"/>
+          <p:cNvSpPr>
+            <a:spLocks noGrp="1" noChangeArrowheads="1"/>
+          </p:cNvSpPr>
+          <p:nvPr>
+            <p:ph type="sldNum" sz="quarter" idx="5"/>
+          </p:nvPr>
+        </p:nvSpPr>
+        <p:spPr>
+          <a:noFill/>
+        </p:spPr>
+        <p:txBody>
+          <a:bodyPr/>
+          <a:lstStyle/>
+          <a:p>
+            <a:fld id="{497D1F5F-AB60-452E-AA79-64E25350F70B}" type="slidenum">
+              <a:rPr lang="pt-PT" smtClean="0">
+                <a:latin typeface="Arial" pitchFamily="34" charset="0"/>
+              </a:rPr>
+              <a:pPr/>
+              <a:t>7</a:t>
+            </a:fld>
+            <a:endParaRPr lang="pt-PT">
+              <a:latin typeface="Arial" pitchFamily="34" charset="0"/>
+            </a:endParaRPr>
+          </a:p>
+        </p:txBody>
+      </p:sp>
+      <p:sp>
+        <p:nvSpPr>
+          <p:cNvPr id="93187" name="Rectangle 2"/>
+          <p:cNvSpPr>
+            <a:spLocks noGrp="1" noRot="1" noChangeAspect="1" noChangeArrowheads="1" noTextEdit="1"/>
+          </p:cNvSpPr>
+          <p:nvPr>
+            <p:ph type="sldImg"/>
+          </p:nvPr>
+        </p:nvSpPr>
+        <p:spPr>
+          <a:ln/>
+        </p:spPr>
+      </p:sp>
+      <p:sp>
+        <p:nvSpPr>
+          <p:cNvPr id="93188" name="Rectangle 3"/>
+          <p:cNvSpPr>
+            <a:spLocks noGrp="1" noChangeArrowheads="1"/>
+          </p:cNvSpPr>
+          <p:nvPr>
+            <p:ph type="body" idx="1"/>
+          </p:nvPr>
+        </p:nvSpPr>
+        <p:spPr>
+          <a:noFill/>
+          <a:ln/>
+        </p:spPr>
+        <p:txBody>
+          <a:bodyPr/>
+          <a:lstStyle/>
+          <a:p>
+            <a:pPr eaLnBrk="1" hangingPunct="1"/>
+            <a:r>
+              <a:rPr lang="pt-PT" dirty="0">
+                <a:latin typeface="Arial" pitchFamily="34" charset="0"/>
+              </a:rPr>
+              <a:t>Tiago (acabar referencias)</a:t>
+            </a:r>
+          </a:p>
+        </p:txBody>
+      </p:sp>
+    </p:spTree>
+    <p:extLst>
+      <p:ext uri="{BB962C8B-B14F-4D97-AF65-F5344CB8AC3E}">
+        <p14:creationId xmlns:p14="http://schemas.microsoft.com/office/powerpoint/2010/main" val="931110731"/>
+      </p:ext>
+    </p:extLst>
+  </p:cSld>
+  <p:clrMapOvr>
+    <a:masterClrMapping/>
+  </p:clrMapOvr>
+</p:notes>
+</file>
+
+<file path=ppt/notesSlides/notesSlide7.xml><?xml version="1.0" encoding="utf-8"?>
+<p:notes xmlns:a="http://schemas.openxmlformats.org/drawingml/2006/main" xmlns:r="http://schemas.openxmlformats.org/officeDocument/2006/relationships" xmlns:p="http://schemas.openxmlformats.org/presentationml/2006/main">
+  <p:cSld>
+    <p:spTree>
+      <p:nvGrpSpPr>
+        <p:cNvPr id="1" name=""/>
+        <p:cNvGrpSpPr/>
+        <p:nvPr/>
+      </p:nvGrpSpPr>
+      <p:grpSpPr>
+        <a:xfrm>
+          <a:off x="0" y="0"/>
+          <a:ext cx="0" cy="0"/>
+          <a:chOff x="0" y="0"/>
+          <a:chExt cx="0" cy="0"/>
+        </a:xfrm>
+      </p:grpSpPr>
+      <p:sp>
+        <p:nvSpPr>
+          <p:cNvPr id="93186" name="Rectangle 7"/>
+          <p:cNvSpPr>
+            <a:spLocks noGrp="1" noChangeArrowheads="1"/>
+          </p:cNvSpPr>
+          <p:nvPr>
+            <p:ph type="sldNum" sz="quarter" idx="5"/>
+          </p:nvPr>
+        </p:nvSpPr>
+        <p:spPr>
+          <a:noFill/>
+        </p:spPr>
+        <p:txBody>
+          <a:bodyPr/>
+          <a:lstStyle/>
+          <a:p>
+            <a:fld id="{497D1F5F-AB60-452E-AA79-64E25350F70B}" type="slidenum">
+              <a:rPr lang="pt-PT" smtClean="0">
+                <a:latin typeface="Arial" pitchFamily="34" charset="0"/>
+              </a:rPr>
+              <a:pPr/>
+              <a:t>8</a:t>
             </a:fld>
             <a:endParaRPr lang="pt-PT">
               <a:latin typeface="Arial" pitchFamily="34" charset="0"/>
@@ -1238,7 +1538,7 @@
             <a:fld id="{A4A3E61B-3AB3-490F-90D4-269C8A444AE7}" type="datetimeFigureOut">
               <a:rPr lang="en-US" smtClean="0"/>
               <a:pPr/>
-              <a:t>9/28/2023</a:t>
+              <a:t>10/1/2023</a:t>
             </a:fld>
             <a:endParaRPr lang="en-US"/>
           </a:p>
@@ -1405,7 +1705,7 @@
             <a:fld id="{A4A3E61B-3AB3-490F-90D4-269C8A444AE7}" type="datetimeFigureOut">
               <a:rPr lang="en-US" smtClean="0"/>
               <a:pPr/>
-              <a:t>9/28/2023</a:t>
+              <a:t>10/1/2023</a:t>
             </a:fld>
             <a:endParaRPr lang="en-US"/>
           </a:p>
@@ -1582,7 +1882,7 @@
             <a:fld id="{A4A3E61B-3AB3-490F-90D4-269C8A444AE7}" type="datetimeFigureOut">
               <a:rPr lang="en-US" smtClean="0"/>
               <a:pPr/>
-              <a:t>9/28/2023</a:t>
+              <a:t>10/1/2023</a:t>
             </a:fld>
             <a:endParaRPr lang="en-US"/>
           </a:p>
@@ -1749,7 +2049,7 @@
             <a:fld id="{A4A3E61B-3AB3-490F-90D4-269C8A444AE7}" type="datetimeFigureOut">
               <a:rPr lang="en-US" smtClean="0"/>
               <a:pPr/>
-              <a:t>9/28/2023</a:t>
+              <a:t>10/1/2023</a:t>
             </a:fld>
             <a:endParaRPr lang="en-US"/>
           </a:p>
@@ -1992,7 +2292,7 @@
             <a:fld id="{A4A3E61B-3AB3-490F-90D4-269C8A444AE7}" type="datetimeFigureOut">
               <a:rPr lang="en-US" smtClean="0"/>
               <a:pPr/>
-              <a:t>9/28/2023</a:t>
+              <a:t>10/1/2023</a:t>
             </a:fld>
             <a:endParaRPr lang="en-US"/>
           </a:p>
@@ -2277,7 +2577,7 @@
             <a:fld id="{A4A3E61B-3AB3-490F-90D4-269C8A444AE7}" type="datetimeFigureOut">
               <a:rPr lang="en-US" smtClean="0"/>
               <a:pPr/>
-              <a:t>9/28/2023</a:t>
+              <a:t>10/1/2023</a:t>
             </a:fld>
             <a:endParaRPr lang="en-US"/>
           </a:p>
@@ -2696,7 +2996,7 @@
             <a:fld id="{A4A3E61B-3AB3-490F-90D4-269C8A444AE7}" type="datetimeFigureOut">
               <a:rPr lang="en-US" smtClean="0"/>
               <a:pPr/>
-              <a:t>9/28/2023</a:t>
+              <a:t>10/1/2023</a:t>
             </a:fld>
             <a:endParaRPr lang="en-US"/>
           </a:p>
@@ -2811,7 +3111,7 @@
             <a:fld id="{A4A3E61B-3AB3-490F-90D4-269C8A444AE7}" type="datetimeFigureOut">
               <a:rPr lang="en-US" smtClean="0"/>
               <a:pPr/>
-              <a:t>9/28/2023</a:t>
+              <a:t>10/1/2023</a:t>
             </a:fld>
             <a:endParaRPr lang="en-US"/>
           </a:p>
@@ -2903,7 +3203,7 @@
             <a:fld id="{A4A3E61B-3AB3-490F-90D4-269C8A444AE7}" type="datetimeFigureOut">
               <a:rPr lang="en-US" smtClean="0"/>
               <a:pPr/>
-              <a:t>9/28/2023</a:t>
+              <a:t>10/1/2023</a:t>
             </a:fld>
             <a:endParaRPr lang="en-US"/>
           </a:p>
@@ -3177,7 +3477,7 @@
             <a:fld id="{A4A3E61B-3AB3-490F-90D4-269C8A444AE7}" type="datetimeFigureOut">
               <a:rPr lang="en-US" smtClean="0"/>
               <a:pPr/>
-              <a:t>9/28/2023</a:t>
+              <a:t>10/1/2023</a:t>
             </a:fld>
             <a:endParaRPr lang="en-US"/>
           </a:p>
@@ -3427,7 +3727,7 @@
             <a:fld id="{A4A3E61B-3AB3-490F-90D4-269C8A444AE7}" type="datetimeFigureOut">
               <a:rPr lang="en-US" smtClean="0"/>
               <a:pPr/>
-              <a:t>9/28/2023</a:t>
+              <a:t>10/1/2023</a:t>
             </a:fld>
             <a:endParaRPr lang="en-US"/>
           </a:p>
@@ -3637,7 +3937,7 @@
             <a:fld id="{A4A3E61B-3AB3-490F-90D4-269C8A444AE7}" type="datetimeFigureOut">
               <a:rPr lang="en-US" smtClean="0"/>
               <a:pPr/>
-              <a:t>9/28/2023</a:t>
+              <a:t>10/1/2023</a:t>
             </a:fld>
             <a:endParaRPr lang="en-US"/>
           </a:p>
@@ -6464,7 +6764,7 @@
                 <a:latin typeface="Arial"/>
                 <a:cs typeface="Arial"/>
               </a:rPr>
-              <a:t> Tema 1</a:t>
+              <a:t> Ficheiro server.py</a:t>
             </a:r>
             <a:endParaRPr lang="pt-PT" sz="2000" b="1" dirty="0">
               <a:effectLst>
@@ -7261,6 +7561,2039 @@
           </a:p>
         </p:txBody>
       </p:sp>
+      <p:pic>
+        <p:nvPicPr>
+          <p:cNvPr id="8" name="Imagem 7">
+            <a:extLst>
+              <a:ext uri="{FF2B5EF4-FFF2-40B4-BE49-F238E27FC236}">
+                <a16:creationId xmlns:a16="http://schemas.microsoft.com/office/drawing/2014/main" id="{85007FEB-E2CC-495C-41F2-9E3FA3458C57}"/>
+              </a:ext>
+            </a:extLst>
+          </p:cNvPr>
+          <p:cNvPicPr>
+            <a:picLocks noChangeAspect="1"/>
+          </p:cNvPicPr>
+          <p:nvPr/>
+        </p:nvPicPr>
+        <p:blipFill rotWithShape="1">
+          <a:blip r:embed="rId7"/>
+          <a:srcRect l="1951" r="-695"/>
+          <a:stretch/>
+        </p:blipFill>
+        <p:spPr>
+          <a:xfrm>
+            <a:off x="3657600" y="1456058"/>
+            <a:ext cx="5181600" cy="4464043"/>
+          </a:xfrm>
+          <a:prstGeom prst="rect">
+            <a:avLst/>
+          </a:prstGeom>
+        </p:spPr>
+      </p:pic>
+    </p:spTree>
+    <p:extLst>
+      <p:ext uri="{BB962C8B-B14F-4D97-AF65-F5344CB8AC3E}">
+        <p14:creationId xmlns:p14="http://schemas.microsoft.com/office/powerpoint/2010/main" val="317161093"/>
+      </p:ext>
+    </p:extLst>
+  </p:cSld>
+  <p:clrMapOvr>
+    <a:masterClrMapping/>
+  </p:clrMapOvr>
+</p:sld>
+</file>
+
+<file path=ppt/slides/slide4.xml><?xml version="1.0" encoding="utf-8"?>
+<p:sld xmlns:a="http://schemas.openxmlformats.org/drawingml/2006/main" xmlns:r="http://schemas.openxmlformats.org/officeDocument/2006/relationships" xmlns:p="http://schemas.openxmlformats.org/presentationml/2006/main">
+  <p:cSld>
+    <p:spTree>
+      <p:nvGrpSpPr>
+        <p:cNvPr id="1" name=""/>
+        <p:cNvGrpSpPr/>
+        <p:nvPr/>
+      </p:nvGrpSpPr>
+      <p:grpSpPr>
+        <a:xfrm>
+          <a:off x="0" y="0"/>
+          <a:ext cx="0" cy="0"/>
+          <a:chOff x="0" y="0"/>
+          <a:chExt cx="0" cy="0"/>
+        </a:xfrm>
+      </p:grpSpPr>
+      <p:sp>
+        <p:nvSpPr>
+          <p:cNvPr id="10243" name="Text Box 10"/>
+          <p:cNvSpPr txBox="1">
+            <a:spLocks noChangeArrowheads="1"/>
+          </p:cNvSpPr>
+          <p:nvPr/>
+        </p:nvSpPr>
+        <p:spPr bwMode="auto">
+          <a:xfrm>
+            <a:off x="8288338" y="6296025"/>
+            <a:ext cx="827087" cy="366713"/>
+          </a:xfrm>
+          <a:prstGeom prst="rect">
+            <a:avLst/>
+          </a:prstGeom>
+          <a:noFill/>
+          <a:ln w="9525">
+            <a:noFill/>
+            <a:miter lim="800000"/>
+            <a:headEnd/>
+            <a:tailEnd/>
+          </a:ln>
+        </p:spPr>
+        <p:txBody>
+          <a:bodyPr>
+            <a:spAutoFit/>
+          </a:bodyPr>
+          <a:lstStyle/>
+          <a:p>
+            <a:pPr>
+              <a:spcBef>
+                <a:spcPct val="50000"/>
+              </a:spcBef>
+            </a:pPr>
+            <a:endParaRPr lang="pt-PT"/>
+          </a:p>
+        </p:txBody>
+      </p:sp>
+      <p:sp>
+        <p:nvSpPr>
+          <p:cNvPr id="10244" name="Rectangle 11"/>
+          <p:cNvSpPr>
+            <a:spLocks noChangeArrowheads="1"/>
+          </p:cNvSpPr>
+          <p:nvPr/>
+        </p:nvSpPr>
+        <p:spPr bwMode="auto">
+          <a:xfrm>
+            <a:off x="8327571" y="6496091"/>
+            <a:ext cx="936625" cy="260350"/>
+          </a:xfrm>
+          <a:prstGeom prst="rect">
+            <a:avLst/>
+          </a:prstGeom>
+          <a:noFill/>
+          <a:ln w="9525">
+            <a:noFill/>
+            <a:miter lim="800000"/>
+            <a:headEnd/>
+            <a:tailEnd/>
+          </a:ln>
+        </p:spPr>
+        <p:txBody>
+          <a:bodyPr anchor="ctr"/>
+          <a:lstStyle/>
+          <a:p>
+            <a:pPr algn="ctr"/>
+            <a:r>
+              <a:rPr lang="pt-PT" sz="1000" dirty="0"/>
+              <a:t>- </a:t>
+            </a:r>
+            <a:fld id="{1234D2FF-8FB9-47A1-B8C9-42A5F500BA2F}" type="slidenum">
+              <a:rPr lang="pt-PT" sz="1000"/>
+              <a:pPr algn="ctr"/>
+              <a:t>4</a:t>
+            </a:fld>
+            <a:r>
+              <a:rPr lang="pt-PT" sz="1000" dirty="0"/>
+              <a:t> -</a:t>
+            </a:r>
+          </a:p>
+        </p:txBody>
+      </p:sp>
+      <p:sp>
+        <p:nvSpPr>
+          <p:cNvPr id="9229" name="Text Box 13"/>
+          <p:cNvSpPr txBox="1">
+            <a:spLocks noChangeArrowheads="1"/>
+          </p:cNvSpPr>
+          <p:nvPr/>
+        </p:nvSpPr>
+        <p:spPr bwMode="auto">
+          <a:xfrm>
+            <a:off x="306388" y="557213"/>
+            <a:ext cx="6981825" cy="400050"/>
+          </a:xfrm>
+          <a:prstGeom prst="rect">
+            <a:avLst/>
+          </a:prstGeom>
+          <a:noFill/>
+          <a:ln w="9525">
+            <a:noFill/>
+            <a:miter lim="800000"/>
+            <a:headEnd/>
+            <a:tailEnd/>
+          </a:ln>
+          <a:effectLst/>
+        </p:spPr>
+        <p:txBody>
+          <a:bodyPr>
+            <a:spAutoFit/>
+          </a:bodyPr>
+          <a:lstStyle/>
+          <a:p>
+            <a:pPr>
+              <a:spcBef>
+                <a:spcPct val="50000"/>
+              </a:spcBef>
+              <a:defRPr/>
+            </a:pPr>
+            <a:r>
+              <a:rPr lang="pt-PT" sz="2000" b="1" dirty="0">
+                <a:solidFill>
+                  <a:srgbClr val="C00000"/>
+                </a:solidFill>
+                <a:effectLst>
+                  <a:outerShdw blurRad="38100" dist="38100" dir="2700000" algn="tl">
+                    <a:srgbClr val="C0C0C0"/>
+                  </a:outerShdw>
+                </a:effectLst>
+                <a:latin typeface="Arial"/>
+                <a:cs typeface="Arial"/>
+              </a:rPr>
+              <a:t>■</a:t>
+            </a:r>
+            <a:r>
+              <a:rPr lang="pt-PT" sz="2000" b="1" dirty="0">
+                <a:effectLst>
+                  <a:outerShdw blurRad="38100" dist="38100" dir="2700000" algn="tl">
+                    <a:srgbClr val="C0C0C0"/>
+                  </a:outerShdw>
+                </a:effectLst>
+                <a:latin typeface="Arial"/>
+                <a:cs typeface="Arial"/>
+              </a:rPr>
+              <a:t> Ficheiro server.py</a:t>
+            </a:r>
+            <a:endParaRPr lang="pt-PT" sz="2000" b="1" dirty="0">
+              <a:effectLst>
+                <a:outerShdw blurRad="38100" dist="38100" dir="2700000" algn="tl">
+                  <a:srgbClr val="C0C0C0"/>
+                </a:outerShdw>
+              </a:effectLst>
+              <a:latin typeface="Arial" charset="0"/>
+            </a:endParaRPr>
+          </a:p>
+        </p:txBody>
+      </p:sp>
+      <p:sp>
+        <p:nvSpPr>
+          <p:cNvPr id="10247" name="Line 15"/>
+          <p:cNvSpPr>
+            <a:spLocks noChangeShapeType="1"/>
+          </p:cNvSpPr>
+          <p:nvPr/>
+        </p:nvSpPr>
+        <p:spPr bwMode="auto">
+          <a:xfrm>
+            <a:off x="250825" y="0"/>
+            <a:ext cx="0" cy="765175"/>
+          </a:xfrm>
+          <a:prstGeom prst="line">
+            <a:avLst/>
+          </a:prstGeom>
+          <a:noFill/>
+          <a:ln w="25400">
+            <a:solidFill>
+              <a:schemeClr val="tx1"/>
+            </a:solidFill>
+            <a:round/>
+            <a:headEnd/>
+            <a:tailEnd/>
+          </a:ln>
+        </p:spPr>
+        <p:txBody>
+          <a:bodyPr/>
+          <a:lstStyle/>
+          <a:p>
+            <a:endParaRPr lang="pt-PT"/>
+          </a:p>
+        </p:txBody>
+      </p:sp>
+      <p:sp>
+        <p:nvSpPr>
+          <p:cNvPr id="9237" name="Text Box 21"/>
+          <p:cNvSpPr txBox="1">
+            <a:spLocks noChangeArrowheads="1"/>
+          </p:cNvSpPr>
+          <p:nvPr/>
+        </p:nvSpPr>
+        <p:spPr bwMode="auto">
+          <a:xfrm>
+            <a:off x="381001" y="44450"/>
+            <a:ext cx="6138752" cy="553998"/>
+          </a:xfrm>
+          <a:prstGeom prst="rect">
+            <a:avLst/>
+          </a:prstGeom>
+          <a:noFill/>
+          <a:ln w="9525">
+            <a:noFill/>
+            <a:miter lim="800000"/>
+            <a:headEnd/>
+            <a:tailEnd/>
+          </a:ln>
+          <a:effectLst/>
+        </p:spPr>
+        <p:txBody>
+          <a:bodyPr wrap="square">
+            <a:spAutoFit/>
+          </a:bodyPr>
+          <a:lstStyle/>
+          <a:p>
+            <a:pPr>
+              <a:spcBef>
+                <a:spcPct val="50000"/>
+              </a:spcBef>
+              <a:defRPr/>
+            </a:pPr>
+            <a:r>
+              <a:rPr lang="pt-PT" sz="1200" b="1" dirty="0">
+                <a:solidFill>
+                  <a:srgbClr val="FF3300"/>
+                </a:solidFill>
+                <a:effectLst>
+                  <a:outerShdw blurRad="38100" dist="38100" dir="2700000" algn="tl">
+                    <a:srgbClr val="C0C0C0"/>
+                  </a:outerShdw>
+                </a:effectLst>
+                <a:latin typeface="Arial" charset="0"/>
+              </a:rPr>
+              <a:t>INTEGRAÇÃO DE SISTEMAS – TRABALHO PRÁTICO</a:t>
+            </a:r>
+          </a:p>
+          <a:p>
+            <a:pPr>
+              <a:spcBef>
+                <a:spcPct val="50000"/>
+              </a:spcBef>
+              <a:defRPr/>
+            </a:pPr>
+            <a:r>
+              <a:rPr lang="pt-PT" sz="1200" b="1" dirty="0">
+                <a:solidFill>
+                  <a:srgbClr val="FF3300"/>
+                </a:solidFill>
+                <a:effectLst>
+                  <a:outerShdw blurRad="38100" dist="38100" dir="2700000" algn="tl">
+                    <a:srgbClr val="C0C0C0"/>
+                  </a:outerShdw>
+                </a:effectLst>
+                <a:latin typeface="Arial" charset="0"/>
+              </a:rPr>
+              <a:t>		       - </a:t>
+            </a:r>
+            <a:r>
+              <a:rPr lang="pt-PT" sz="1000" b="1" dirty="0">
+                <a:solidFill>
+                  <a:srgbClr val="FF3300"/>
+                </a:solidFill>
+                <a:effectLst>
+                  <a:outerShdw blurRad="38100" dist="38100" dir="2700000" algn="tl">
+                    <a:srgbClr val="C0C0C0"/>
+                  </a:outerShdw>
+                </a:effectLst>
+                <a:latin typeface="Arial" charset="0"/>
+              </a:rPr>
+              <a:t>IMPLEMENTAÇÃO DE EXEMPLOS DE SOCKETS EM PYTHON</a:t>
+            </a:r>
+          </a:p>
+        </p:txBody>
+      </p:sp>
+      <p:sp>
+        <p:nvSpPr>
+          <p:cNvPr id="19" name="Marcador de Posição de Conteúdo 2"/>
+          <p:cNvSpPr txBox="1">
+            <a:spLocks/>
+          </p:cNvSpPr>
+          <p:nvPr/>
+        </p:nvSpPr>
+        <p:spPr>
+          <a:xfrm>
+            <a:off x="457200" y="1219200"/>
+            <a:ext cx="8229600" cy="4937760"/>
+          </a:xfrm>
+          <a:prstGeom prst="rect">
+            <a:avLst/>
+          </a:prstGeom>
+        </p:spPr>
+        <p:txBody>
+          <a:bodyPr vert="horz" lIns="91440" tIns="45720" rIns="91440" bIns="45720" rtlCol="0">
+            <a:normAutofit/>
+          </a:bodyPr>
+          <a:lstStyle/>
+          <a:p>
+            <a:pPr>
+              <a:lnSpc>
+                <a:spcPct val="150000"/>
+              </a:lnSpc>
+            </a:pPr>
+            <a:r>
+              <a:rPr lang="pt-PT" dirty="0">
+                <a:latin typeface="Arial" pitchFamily="34" charset="0"/>
+                <a:cs typeface="Arial" pitchFamily="34" charset="0"/>
+              </a:rPr>
+              <a:t>Registo de Evidências:</a:t>
+            </a:r>
+            <a:endParaRPr lang="en-US" dirty="0">
+              <a:latin typeface="Arial" pitchFamily="34" charset="0"/>
+              <a:cs typeface="Arial" pitchFamily="34" charset="0"/>
+            </a:endParaRPr>
+          </a:p>
+          <a:p>
+            <a:pPr>
+              <a:lnSpc>
+                <a:spcPct val="200000"/>
+              </a:lnSpc>
+              <a:spcBef>
+                <a:spcPct val="20000"/>
+              </a:spcBef>
+            </a:pPr>
+            <a:endParaRPr lang="pt-PT" sz="2000" dirty="0">
+              <a:latin typeface="Arial" pitchFamily="34" charset="0"/>
+              <a:cs typeface="Arial" pitchFamily="34" charset="0"/>
+            </a:endParaRPr>
+          </a:p>
+          <a:p>
+            <a:pPr lvl="0">
+              <a:lnSpc>
+                <a:spcPct val="200000"/>
+              </a:lnSpc>
+              <a:spcBef>
+                <a:spcPct val="20000"/>
+              </a:spcBef>
+            </a:pPr>
+            <a:endParaRPr kumimoji="0" lang="pt-PT" sz="2000" b="0" i="0" u="none" strike="noStrike" kern="1200" cap="none" spc="0" normalizeH="0" baseline="0" noProof="0" dirty="0">
+              <a:ln>
+                <a:noFill/>
+              </a:ln>
+              <a:effectLst/>
+              <a:uLnTx/>
+              <a:uFillTx/>
+              <a:latin typeface="Arial" pitchFamily="34" charset="0"/>
+              <a:cs typeface="Arial" pitchFamily="34" charset="0"/>
+            </a:endParaRPr>
+          </a:p>
+          <a:p>
+            <a:pPr marL="457200" marR="0" lvl="1" indent="0" defTabSz="914400" rtl="0" eaLnBrk="1" fontAlgn="auto" latinLnBrk="0" hangingPunct="1">
+              <a:lnSpc>
+                <a:spcPct val="200000"/>
+              </a:lnSpc>
+              <a:spcBef>
+                <a:spcPct val="20000"/>
+              </a:spcBef>
+              <a:spcAft>
+                <a:spcPts val="0"/>
+              </a:spcAft>
+              <a:buClrTx/>
+              <a:buSzTx/>
+              <a:buFont typeface="Arial" pitchFamily="34" charset="0"/>
+              <a:buNone/>
+              <a:tabLst/>
+              <a:defRPr/>
+            </a:pPr>
+            <a:endParaRPr kumimoji="0" lang="pt-PT" sz="2000" b="0" i="0" u="none" strike="noStrike" kern="1200" cap="none" spc="0" normalizeH="0" baseline="0" noProof="0" dirty="0">
+              <a:ln>
+                <a:noFill/>
+              </a:ln>
+              <a:effectLst/>
+              <a:uLnTx/>
+              <a:uFillTx/>
+              <a:latin typeface="Arial" pitchFamily="34" charset="0"/>
+              <a:cs typeface="Arial" pitchFamily="34" charset="0"/>
+            </a:endParaRPr>
+          </a:p>
+          <a:p>
+            <a:pPr marL="457200" marR="0" lvl="1" indent="0" defTabSz="914400" rtl="0" eaLnBrk="1" fontAlgn="auto" latinLnBrk="0" hangingPunct="1">
+              <a:lnSpc>
+                <a:spcPct val="200000"/>
+              </a:lnSpc>
+              <a:spcBef>
+                <a:spcPct val="20000"/>
+              </a:spcBef>
+              <a:spcAft>
+                <a:spcPts val="0"/>
+              </a:spcAft>
+              <a:buClrTx/>
+              <a:buSzTx/>
+              <a:buFont typeface="Arial" pitchFamily="34" charset="0"/>
+              <a:buNone/>
+              <a:tabLst/>
+              <a:defRPr/>
+            </a:pPr>
+            <a:endParaRPr kumimoji="0" lang="pt-PT" sz="2000" b="0" i="0" u="none" strike="noStrike" kern="1200" cap="none" spc="0" normalizeH="0" baseline="0" noProof="0" dirty="0">
+              <a:ln>
+                <a:noFill/>
+              </a:ln>
+              <a:effectLst/>
+              <a:uLnTx/>
+              <a:uFillTx/>
+              <a:latin typeface="Arial" pitchFamily="34" charset="0"/>
+              <a:cs typeface="Arial" pitchFamily="34" charset="0"/>
+            </a:endParaRPr>
+          </a:p>
+          <a:p>
+            <a:pPr marL="0" marR="0" lvl="0" indent="0" defTabSz="914400" rtl="0" eaLnBrk="1" fontAlgn="auto" latinLnBrk="0" hangingPunct="1">
+              <a:lnSpc>
+                <a:spcPct val="200000"/>
+              </a:lnSpc>
+              <a:spcBef>
+                <a:spcPct val="20000"/>
+              </a:spcBef>
+              <a:spcAft>
+                <a:spcPts val="0"/>
+              </a:spcAft>
+              <a:buClrTx/>
+              <a:buSzTx/>
+              <a:buFont typeface="Arial" pitchFamily="34" charset="0"/>
+              <a:buNone/>
+              <a:tabLst/>
+              <a:defRPr/>
+            </a:pPr>
+            <a:endParaRPr kumimoji="0" lang="pt-PT" sz="2000" b="0" i="0" u="none" strike="noStrike" kern="1200" cap="none" spc="0" normalizeH="0" baseline="0" noProof="0" dirty="0">
+              <a:ln>
+                <a:noFill/>
+              </a:ln>
+              <a:effectLst/>
+              <a:uLnTx/>
+              <a:uFillTx/>
+              <a:latin typeface="Arial" pitchFamily="34" charset="0"/>
+              <a:cs typeface="Arial" pitchFamily="34" charset="0"/>
+            </a:endParaRPr>
+          </a:p>
+          <a:p>
+            <a:pPr marL="0" marR="0" lvl="0" indent="0" defTabSz="914400" rtl="0" eaLnBrk="1" fontAlgn="auto" latinLnBrk="0" hangingPunct="1">
+              <a:lnSpc>
+                <a:spcPct val="200000"/>
+              </a:lnSpc>
+              <a:spcBef>
+                <a:spcPct val="20000"/>
+              </a:spcBef>
+              <a:spcAft>
+                <a:spcPts val="0"/>
+              </a:spcAft>
+              <a:buClrTx/>
+              <a:buSzTx/>
+              <a:buFont typeface="Arial" pitchFamily="34" charset="0"/>
+              <a:buNone/>
+              <a:tabLst/>
+              <a:defRPr/>
+            </a:pPr>
+            <a:endParaRPr kumimoji="0" lang="pt-PT" sz="2000" b="0" i="0" u="none" strike="noStrike" kern="1200" cap="none" spc="0" normalizeH="0" baseline="0" noProof="0" dirty="0">
+              <a:ln>
+                <a:noFill/>
+              </a:ln>
+              <a:effectLst/>
+              <a:uLnTx/>
+              <a:uFillTx/>
+              <a:latin typeface="Arial" pitchFamily="34" charset="0"/>
+              <a:cs typeface="Arial" pitchFamily="34" charset="0"/>
+            </a:endParaRPr>
+          </a:p>
+          <a:p>
+            <a:pPr marL="0" marR="0" lvl="0" indent="0" defTabSz="914400" rtl="0" eaLnBrk="1" fontAlgn="auto" latinLnBrk="0" hangingPunct="1">
+              <a:lnSpc>
+                <a:spcPct val="200000"/>
+              </a:lnSpc>
+              <a:spcBef>
+                <a:spcPct val="20000"/>
+              </a:spcBef>
+              <a:spcAft>
+                <a:spcPts val="0"/>
+              </a:spcAft>
+              <a:buClrTx/>
+              <a:buSzTx/>
+              <a:buFont typeface="Arial" pitchFamily="34" charset="0"/>
+              <a:buNone/>
+              <a:tabLst/>
+              <a:defRPr/>
+            </a:pPr>
+            <a:endParaRPr kumimoji="0" lang="pt-PT" sz="2000" b="0" i="0" u="none" strike="noStrike" kern="1200" cap="none" spc="0" normalizeH="0" baseline="0" noProof="0" dirty="0">
+              <a:ln>
+                <a:noFill/>
+              </a:ln>
+              <a:effectLst/>
+              <a:uLnTx/>
+              <a:uFillTx/>
+              <a:latin typeface="Arial" pitchFamily="34" charset="0"/>
+              <a:cs typeface="Arial" pitchFamily="34" charset="0"/>
+            </a:endParaRPr>
+          </a:p>
+        </p:txBody>
+      </p:sp>
+      <p:pic>
+        <p:nvPicPr>
+          <p:cNvPr id="7" name="Imagem 6">
+            <a:extLst>
+              <a:ext uri="{FF2B5EF4-FFF2-40B4-BE49-F238E27FC236}">
+                <a16:creationId xmlns:a16="http://schemas.microsoft.com/office/drawing/2014/main" id="{54D42837-E70D-4C64-A8A7-E7F751502B92}"/>
+              </a:ext>
+            </a:extLst>
+          </p:cNvPr>
+          <p:cNvPicPr>
+            <a:picLocks noChangeAspect="1"/>
+          </p:cNvPicPr>
+          <p:nvPr/>
+        </p:nvPicPr>
+        <p:blipFill>
+          <a:blip r:embed="rId3"/>
+          <a:stretch>
+            <a:fillRect/>
+          </a:stretch>
+        </p:blipFill>
+        <p:spPr>
+          <a:xfrm>
+            <a:off x="101225" y="904241"/>
+            <a:ext cx="9014192" cy="266482"/>
+          </a:xfrm>
+          <a:prstGeom prst="rect">
+            <a:avLst/>
+          </a:prstGeom>
+        </p:spPr>
+      </p:pic>
+      <p:pic>
+        <p:nvPicPr>
+          <p:cNvPr id="9" name="Imagem 8">
+            <a:extLst>
+              <a:ext uri="{FF2B5EF4-FFF2-40B4-BE49-F238E27FC236}">
+                <a16:creationId xmlns:a16="http://schemas.microsoft.com/office/drawing/2014/main" id="{81982921-1900-46B5-BE82-07BECCD63918}"/>
+              </a:ext>
+            </a:extLst>
+          </p:cNvPr>
+          <p:cNvPicPr>
+            <a:picLocks noChangeAspect="1"/>
+          </p:cNvPicPr>
+          <p:nvPr/>
+        </p:nvPicPr>
+        <p:blipFill>
+          <a:blip r:embed="rId4"/>
+          <a:stretch>
+            <a:fillRect/>
+          </a:stretch>
+        </p:blipFill>
+        <p:spPr>
+          <a:xfrm>
+            <a:off x="0" y="6320212"/>
+            <a:ext cx="9144000" cy="253252"/>
+          </a:xfrm>
+          <a:prstGeom prst="rect">
+            <a:avLst/>
+          </a:prstGeom>
+        </p:spPr>
+      </p:pic>
+      <p:pic>
+        <p:nvPicPr>
+          <p:cNvPr id="13" name="Imagem 12">
+            <a:extLst>
+              <a:ext uri="{FF2B5EF4-FFF2-40B4-BE49-F238E27FC236}">
+                <a16:creationId xmlns:a16="http://schemas.microsoft.com/office/drawing/2014/main" id="{BE263CB9-5E3B-4385-9450-974CDF0F6C7D}"/>
+              </a:ext>
+            </a:extLst>
+          </p:cNvPr>
+          <p:cNvPicPr>
+            <a:picLocks noChangeAspect="1"/>
+          </p:cNvPicPr>
+          <p:nvPr/>
+        </p:nvPicPr>
+        <p:blipFill>
+          <a:blip r:embed="rId5" cstate="print">
+            <a:extLst>
+              <a:ext uri="{28A0092B-C50C-407E-A947-70E740481C1C}">
+                <a14:useLocalDpi xmlns:a14="http://schemas.microsoft.com/office/drawing/2010/main" val="0"/>
+              </a:ext>
+            </a:extLst>
+          </a:blip>
+          <a:stretch>
+            <a:fillRect/>
+          </a:stretch>
+        </p:blipFill>
+        <p:spPr>
+          <a:xfrm>
+            <a:off x="238125" y="6488336"/>
+            <a:ext cx="545959" cy="199802"/>
+          </a:xfrm>
+          <a:prstGeom prst="rect">
+            <a:avLst/>
+          </a:prstGeom>
+        </p:spPr>
+      </p:pic>
+      <p:sp>
+        <p:nvSpPr>
+          <p:cNvPr id="3" name="Rectângulo 19">
+            <a:extLst>
+              <a:ext uri="{FF2B5EF4-FFF2-40B4-BE49-F238E27FC236}">
+                <a16:creationId xmlns:a16="http://schemas.microsoft.com/office/drawing/2014/main" id="{850208AF-C5A5-C009-177D-8C27BB5DCC8B}"/>
+              </a:ext>
+            </a:extLst>
+          </p:cNvPr>
+          <p:cNvSpPr/>
+          <p:nvPr/>
+        </p:nvSpPr>
+        <p:spPr>
+          <a:xfrm>
+            <a:off x="5535613" y="553019"/>
+            <a:ext cx="3505200" cy="261610"/>
+          </a:xfrm>
+          <a:prstGeom prst="rect">
+            <a:avLst/>
+          </a:prstGeom>
+        </p:spPr>
+        <p:txBody>
+          <a:bodyPr wrap="square">
+            <a:spAutoFit/>
+          </a:bodyPr>
+          <a:lstStyle/>
+          <a:p>
+            <a:pPr algn="r"/>
+            <a:r>
+              <a:rPr lang="pt-PT" sz="1100" b="1" cap="all" dirty="0" err="1">
+                <a:highlight>
+                  <a:srgbClr val="FFFF00"/>
+                </a:highlight>
+              </a:rPr>
+              <a:t>Degree</a:t>
+            </a:r>
+            <a:r>
+              <a:rPr lang="pt-PT" sz="1100" b="1" cap="all" dirty="0">
+                <a:highlight>
+                  <a:srgbClr val="FFFF00"/>
+                </a:highlight>
+              </a:rPr>
+              <a:t> IN </a:t>
+            </a:r>
+            <a:r>
+              <a:rPr lang="pt-PT" sz="1100" b="1" cap="all" dirty="0" err="1">
+                <a:highlight>
+                  <a:srgbClr val="FFFF00"/>
+                </a:highlight>
+              </a:rPr>
+              <a:t>Informatics</a:t>
+            </a:r>
+            <a:r>
+              <a:rPr lang="pt-PT" sz="1100" b="1" cap="all" dirty="0">
+                <a:highlight>
+                  <a:srgbClr val="FFFF00"/>
+                </a:highlight>
+              </a:rPr>
+              <a:t> </a:t>
+            </a:r>
+            <a:r>
+              <a:rPr lang="pt-PT" sz="1100" b="1" cap="all" dirty="0" err="1">
+                <a:highlight>
+                  <a:srgbClr val="FFFF00"/>
+                </a:highlight>
+              </a:rPr>
+              <a:t>engineering</a:t>
+            </a:r>
+            <a:endParaRPr lang="pt-PT" sz="1100" dirty="0">
+              <a:highlight>
+                <a:srgbClr val="FFFF00"/>
+              </a:highlight>
+            </a:endParaRPr>
+          </a:p>
+        </p:txBody>
+      </p:sp>
+      <p:pic>
+        <p:nvPicPr>
+          <p:cNvPr id="5" name="Imagem 4">
+            <a:extLst>
+              <a:ext uri="{FF2B5EF4-FFF2-40B4-BE49-F238E27FC236}">
+                <a16:creationId xmlns:a16="http://schemas.microsoft.com/office/drawing/2014/main" id="{4B69841B-4743-42E9-837A-73B87FC5C8CF}"/>
+              </a:ext>
+            </a:extLst>
+          </p:cNvPr>
+          <p:cNvPicPr>
+            <a:picLocks noChangeAspect="1"/>
+          </p:cNvPicPr>
+          <p:nvPr/>
+        </p:nvPicPr>
+        <p:blipFill>
+          <a:blip r:embed="rId6" cstate="print">
+            <a:extLst>
+              <a:ext uri="{28A0092B-C50C-407E-A947-70E740481C1C}">
+                <a14:useLocalDpi xmlns:a14="http://schemas.microsoft.com/office/drawing/2010/main" val="0"/>
+              </a:ext>
+            </a:extLst>
+          </a:blip>
+          <a:stretch>
+            <a:fillRect/>
+          </a:stretch>
+        </p:blipFill>
+        <p:spPr>
+          <a:xfrm>
+            <a:off x="6575316" y="9186"/>
+            <a:ext cx="2575034" cy="639880"/>
+          </a:xfrm>
+          <a:prstGeom prst="rect">
+            <a:avLst/>
+          </a:prstGeom>
+        </p:spPr>
+      </p:pic>
+      <p:sp>
+        <p:nvSpPr>
+          <p:cNvPr id="4" name="Subtítulo 2">
+            <a:extLst>
+              <a:ext uri="{FF2B5EF4-FFF2-40B4-BE49-F238E27FC236}">
+                <a16:creationId xmlns:a16="http://schemas.microsoft.com/office/drawing/2014/main" id="{0F443CA8-A853-9EB3-2038-4F6563C023F0}"/>
+              </a:ext>
+            </a:extLst>
+          </p:cNvPr>
+          <p:cNvSpPr txBox="1">
+            <a:spLocks/>
+          </p:cNvSpPr>
+          <p:nvPr/>
+        </p:nvSpPr>
+        <p:spPr>
+          <a:xfrm>
+            <a:off x="836017" y="6524516"/>
+            <a:ext cx="7698382" cy="162409"/>
+          </a:xfrm>
+          <a:prstGeom prst="rect">
+            <a:avLst/>
+          </a:prstGeom>
+        </p:spPr>
+        <p:txBody>
+          <a:bodyPr vert="horz" lIns="68580" tIns="34290" rIns="68580" bIns="34290" rtlCol="0">
+            <a:normAutofit fontScale="92500" lnSpcReduction="20000"/>
+          </a:bodyPr>
+          <a:lstStyle>
+            <a:lvl1pPr marL="0" indent="0" algn="ctr" defTabSz="914400" rtl="0" eaLnBrk="1" latinLnBrk="0" hangingPunct="1">
+              <a:lnSpc>
+                <a:spcPct val="90000"/>
+              </a:lnSpc>
+              <a:spcBef>
+                <a:spcPts val="1000"/>
+              </a:spcBef>
+              <a:buFont typeface="Arial" panose="020B0604020202020204" pitchFamily="34" charset="0"/>
+              <a:buNone/>
+              <a:defRPr sz="2400" kern="1200">
+                <a:solidFill>
+                  <a:schemeClr val="tx1"/>
+                </a:solidFill>
+                <a:latin typeface="+mn-lt"/>
+                <a:ea typeface="+mn-ea"/>
+                <a:cs typeface="+mn-cs"/>
+              </a:defRPr>
+            </a:lvl1pPr>
+            <a:lvl2pPr marL="457200" indent="0" algn="ctr" defTabSz="914400" rtl="0" eaLnBrk="1" latinLnBrk="0" hangingPunct="1">
+              <a:lnSpc>
+                <a:spcPct val="90000"/>
+              </a:lnSpc>
+              <a:spcBef>
+                <a:spcPts val="500"/>
+              </a:spcBef>
+              <a:buFont typeface="Arial" panose="020B0604020202020204" pitchFamily="34" charset="0"/>
+              <a:buNone/>
+              <a:defRPr sz="2000" kern="1200">
+                <a:solidFill>
+                  <a:schemeClr val="tx1"/>
+                </a:solidFill>
+                <a:latin typeface="+mn-lt"/>
+                <a:ea typeface="+mn-ea"/>
+                <a:cs typeface="+mn-cs"/>
+              </a:defRPr>
+            </a:lvl2pPr>
+            <a:lvl3pPr marL="914400" indent="0" algn="ctr" defTabSz="914400" rtl="0" eaLnBrk="1" latinLnBrk="0" hangingPunct="1">
+              <a:lnSpc>
+                <a:spcPct val="90000"/>
+              </a:lnSpc>
+              <a:spcBef>
+                <a:spcPts val="500"/>
+              </a:spcBef>
+              <a:buFont typeface="Arial" panose="020B0604020202020204" pitchFamily="34" charset="0"/>
+              <a:buNone/>
+              <a:defRPr sz="1800" kern="1200">
+                <a:solidFill>
+                  <a:schemeClr val="tx1"/>
+                </a:solidFill>
+                <a:latin typeface="+mn-lt"/>
+                <a:ea typeface="+mn-ea"/>
+                <a:cs typeface="+mn-cs"/>
+              </a:defRPr>
+            </a:lvl3pPr>
+            <a:lvl4pPr marL="1371600" indent="0" algn="ctr" defTabSz="914400" rtl="0" eaLnBrk="1" latinLnBrk="0" hangingPunct="1">
+              <a:lnSpc>
+                <a:spcPct val="90000"/>
+              </a:lnSpc>
+              <a:spcBef>
+                <a:spcPts val="500"/>
+              </a:spcBef>
+              <a:buFont typeface="Arial" panose="020B0604020202020204" pitchFamily="34" charset="0"/>
+              <a:buNone/>
+              <a:defRPr sz="1600" kern="1200">
+                <a:solidFill>
+                  <a:schemeClr val="tx1"/>
+                </a:solidFill>
+                <a:latin typeface="+mn-lt"/>
+                <a:ea typeface="+mn-ea"/>
+                <a:cs typeface="+mn-cs"/>
+              </a:defRPr>
+            </a:lvl4pPr>
+            <a:lvl5pPr marL="1828800" indent="0" algn="ctr" defTabSz="914400" rtl="0" eaLnBrk="1" latinLnBrk="0" hangingPunct="1">
+              <a:lnSpc>
+                <a:spcPct val="90000"/>
+              </a:lnSpc>
+              <a:spcBef>
+                <a:spcPts val="500"/>
+              </a:spcBef>
+              <a:buFont typeface="Arial" panose="020B0604020202020204" pitchFamily="34" charset="0"/>
+              <a:buNone/>
+              <a:defRPr sz="1600" kern="1200">
+                <a:solidFill>
+                  <a:schemeClr val="tx1"/>
+                </a:solidFill>
+                <a:latin typeface="+mn-lt"/>
+                <a:ea typeface="+mn-ea"/>
+                <a:cs typeface="+mn-cs"/>
+              </a:defRPr>
+            </a:lvl5pPr>
+            <a:lvl6pPr marL="2286000" indent="0" algn="ctr" defTabSz="914400" rtl="0" eaLnBrk="1" latinLnBrk="0" hangingPunct="1">
+              <a:lnSpc>
+                <a:spcPct val="90000"/>
+              </a:lnSpc>
+              <a:spcBef>
+                <a:spcPts val="500"/>
+              </a:spcBef>
+              <a:buFont typeface="Arial" panose="020B0604020202020204" pitchFamily="34" charset="0"/>
+              <a:buNone/>
+              <a:defRPr sz="1600" kern="1200">
+                <a:solidFill>
+                  <a:schemeClr val="tx1"/>
+                </a:solidFill>
+                <a:latin typeface="+mn-lt"/>
+                <a:ea typeface="+mn-ea"/>
+                <a:cs typeface="+mn-cs"/>
+              </a:defRPr>
+            </a:lvl6pPr>
+            <a:lvl7pPr marL="2743200" indent="0" algn="ctr" defTabSz="914400" rtl="0" eaLnBrk="1" latinLnBrk="0" hangingPunct="1">
+              <a:lnSpc>
+                <a:spcPct val="90000"/>
+              </a:lnSpc>
+              <a:spcBef>
+                <a:spcPts val="500"/>
+              </a:spcBef>
+              <a:buFont typeface="Arial" panose="020B0604020202020204" pitchFamily="34" charset="0"/>
+              <a:buNone/>
+              <a:defRPr sz="1600" kern="1200">
+                <a:solidFill>
+                  <a:schemeClr val="tx1"/>
+                </a:solidFill>
+                <a:latin typeface="+mn-lt"/>
+                <a:ea typeface="+mn-ea"/>
+                <a:cs typeface="+mn-cs"/>
+              </a:defRPr>
+            </a:lvl7pPr>
+            <a:lvl8pPr marL="3200400" indent="0" algn="ctr" defTabSz="914400" rtl="0" eaLnBrk="1" latinLnBrk="0" hangingPunct="1">
+              <a:lnSpc>
+                <a:spcPct val="90000"/>
+              </a:lnSpc>
+              <a:spcBef>
+                <a:spcPts val="500"/>
+              </a:spcBef>
+              <a:buFont typeface="Arial" panose="020B0604020202020204" pitchFamily="34" charset="0"/>
+              <a:buNone/>
+              <a:defRPr sz="1600" kern="1200">
+                <a:solidFill>
+                  <a:schemeClr val="tx1"/>
+                </a:solidFill>
+                <a:latin typeface="+mn-lt"/>
+                <a:ea typeface="+mn-ea"/>
+                <a:cs typeface="+mn-cs"/>
+              </a:defRPr>
+            </a:lvl8pPr>
+            <a:lvl9pPr marL="3657600" indent="0" algn="ctr" defTabSz="914400" rtl="0" eaLnBrk="1" latinLnBrk="0" hangingPunct="1">
+              <a:lnSpc>
+                <a:spcPct val="90000"/>
+              </a:lnSpc>
+              <a:spcBef>
+                <a:spcPts val="500"/>
+              </a:spcBef>
+              <a:buFont typeface="Arial" panose="020B0604020202020204" pitchFamily="34" charset="0"/>
+              <a:buNone/>
+              <a:defRPr sz="1600" kern="1200">
+                <a:solidFill>
+                  <a:schemeClr val="tx1"/>
+                </a:solidFill>
+                <a:latin typeface="+mn-lt"/>
+                <a:ea typeface="+mn-ea"/>
+                <a:cs typeface="+mn-cs"/>
+              </a:defRPr>
+            </a:lvl9pPr>
+          </a:lstStyle>
+          <a:p>
+            <a:pPr algn="l"/>
+            <a:r>
+              <a:rPr lang="pt-PT" sz="900" dirty="0">
+                <a:latin typeface="Arial" charset="0"/>
+                <a:ea typeface="Arial" charset="0"/>
+                <a:cs typeface="Arial" charset="0"/>
+              </a:rPr>
+              <a:t>@Diogo Reis, Diogo Pinheiro| </a:t>
+            </a:r>
+            <a:r>
+              <a:rPr lang="pt-PT" sz="900" b="1" dirty="0">
+                <a:solidFill>
+                  <a:srgbClr val="C00000"/>
+                </a:solidFill>
+                <a:latin typeface="Arial" charset="0"/>
+                <a:ea typeface="Arial" charset="0"/>
+                <a:cs typeface="Arial" charset="0"/>
+              </a:rPr>
+              <a:t>Unidade Curricular: INTEGRAÇÃO DE SISTEMAS </a:t>
+            </a:r>
+            <a:r>
+              <a:rPr lang="pt-PT" sz="900" dirty="0">
+                <a:latin typeface="Arial" charset="0"/>
+                <a:ea typeface="Arial" charset="0"/>
+                <a:cs typeface="Arial" charset="0"/>
+              </a:rPr>
+              <a:t>– Ano Letivo 2023/2024 – </a:t>
+            </a:r>
+            <a:r>
+              <a:rPr lang="pt-PT" sz="900" b="1" dirty="0">
+                <a:latin typeface="Arial" charset="0"/>
+                <a:ea typeface="Arial" charset="0"/>
+                <a:cs typeface="Arial" charset="0"/>
+              </a:rPr>
+              <a:t>Trabalho Prático</a:t>
+            </a:r>
+          </a:p>
+        </p:txBody>
+      </p:sp>
+      <p:pic>
+        <p:nvPicPr>
+          <p:cNvPr id="6" name="Imagem 5">
+            <a:extLst>
+              <a:ext uri="{FF2B5EF4-FFF2-40B4-BE49-F238E27FC236}">
+                <a16:creationId xmlns:a16="http://schemas.microsoft.com/office/drawing/2014/main" id="{58C49688-E5C7-0FCE-13D8-709EF6D5896F}"/>
+              </a:ext>
+            </a:extLst>
+          </p:cNvPr>
+          <p:cNvPicPr>
+            <a:picLocks noChangeAspect="1"/>
+          </p:cNvPicPr>
+          <p:nvPr/>
+        </p:nvPicPr>
+        <p:blipFill rotWithShape="1">
+          <a:blip r:embed="rId7"/>
+          <a:srcRect l="1014"/>
+          <a:stretch/>
+        </p:blipFill>
+        <p:spPr>
+          <a:xfrm>
+            <a:off x="3200400" y="1611914"/>
+            <a:ext cx="5638800" cy="4152331"/>
+          </a:xfrm>
+          <a:prstGeom prst="rect">
+            <a:avLst/>
+          </a:prstGeom>
+        </p:spPr>
+      </p:pic>
+    </p:spTree>
+    <p:extLst>
+      <p:ext uri="{BB962C8B-B14F-4D97-AF65-F5344CB8AC3E}">
+        <p14:creationId xmlns:p14="http://schemas.microsoft.com/office/powerpoint/2010/main" val="3889256685"/>
+      </p:ext>
+    </p:extLst>
+  </p:cSld>
+  <p:clrMapOvr>
+    <a:masterClrMapping/>
+  </p:clrMapOvr>
+</p:sld>
+</file>
+
+<file path=ppt/slides/slide5.xml><?xml version="1.0" encoding="utf-8"?>
+<p:sld xmlns:a="http://schemas.openxmlformats.org/drawingml/2006/main" xmlns:r="http://schemas.openxmlformats.org/officeDocument/2006/relationships" xmlns:p="http://schemas.openxmlformats.org/presentationml/2006/main">
+  <p:cSld>
+    <p:spTree>
+      <p:nvGrpSpPr>
+        <p:cNvPr id="1" name=""/>
+        <p:cNvGrpSpPr/>
+        <p:nvPr/>
+      </p:nvGrpSpPr>
+      <p:grpSpPr>
+        <a:xfrm>
+          <a:off x="0" y="0"/>
+          <a:ext cx="0" cy="0"/>
+          <a:chOff x="0" y="0"/>
+          <a:chExt cx="0" cy="0"/>
+        </a:xfrm>
+      </p:grpSpPr>
+      <p:sp>
+        <p:nvSpPr>
+          <p:cNvPr id="10243" name="Text Box 10"/>
+          <p:cNvSpPr txBox="1">
+            <a:spLocks noChangeArrowheads="1"/>
+          </p:cNvSpPr>
+          <p:nvPr/>
+        </p:nvSpPr>
+        <p:spPr bwMode="auto">
+          <a:xfrm>
+            <a:off x="8288338" y="6296025"/>
+            <a:ext cx="827087" cy="366713"/>
+          </a:xfrm>
+          <a:prstGeom prst="rect">
+            <a:avLst/>
+          </a:prstGeom>
+          <a:noFill/>
+          <a:ln w="9525">
+            <a:noFill/>
+            <a:miter lim="800000"/>
+            <a:headEnd/>
+            <a:tailEnd/>
+          </a:ln>
+        </p:spPr>
+        <p:txBody>
+          <a:bodyPr>
+            <a:spAutoFit/>
+          </a:bodyPr>
+          <a:lstStyle/>
+          <a:p>
+            <a:pPr>
+              <a:spcBef>
+                <a:spcPct val="50000"/>
+              </a:spcBef>
+            </a:pPr>
+            <a:endParaRPr lang="pt-PT"/>
+          </a:p>
+        </p:txBody>
+      </p:sp>
+      <p:sp>
+        <p:nvSpPr>
+          <p:cNvPr id="10244" name="Rectangle 11"/>
+          <p:cNvSpPr>
+            <a:spLocks noChangeArrowheads="1"/>
+          </p:cNvSpPr>
+          <p:nvPr/>
+        </p:nvSpPr>
+        <p:spPr bwMode="auto">
+          <a:xfrm>
+            <a:off x="8327571" y="6496091"/>
+            <a:ext cx="936625" cy="260350"/>
+          </a:xfrm>
+          <a:prstGeom prst="rect">
+            <a:avLst/>
+          </a:prstGeom>
+          <a:noFill/>
+          <a:ln w="9525">
+            <a:noFill/>
+            <a:miter lim="800000"/>
+            <a:headEnd/>
+            <a:tailEnd/>
+          </a:ln>
+        </p:spPr>
+        <p:txBody>
+          <a:bodyPr anchor="ctr"/>
+          <a:lstStyle/>
+          <a:p>
+            <a:pPr algn="ctr"/>
+            <a:r>
+              <a:rPr lang="pt-PT" sz="1000" dirty="0"/>
+              <a:t>- </a:t>
+            </a:r>
+            <a:fld id="{1234D2FF-8FB9-47A1-B8C9-42A5F500BA2F}" type="slidenum">
+              <a:rPr lang="pt-PT" sz="1000"/>
+              <a:pPr algn="ctr"/>
+              <a:t>5</a:t>
+            </a:fld>
+            <a:r>
+              <a:rPr lang="pt-PT" sz="1000" dirty="0"/>
+              <a:t> -</a:t>
+            </a:r>
+          </a:p>
+        </p:txBody>
+      </p:sp>
+      <p:sp>
+        <p:nvSpPr>
+          <p:cNvPr id="9229" name="Text Box 13"/>
+          <p:cNvSpPr txBox="1">
+            <a:spLocks noChangeArrowheads="1"/>
+          </p:cNvSpPr>
+          <p:nvPr/>
+        </p:nvSpPr>
+        <p:spPr bwMode="auto">
+          <a:xfrm>
+            <a:off x="306388" y="557213"/>
+            <a:ext cx="6981825" cy="400050"/>
+          </a:xfrm>
+          <a:prstGeom prst="rect">
+            <a:avLst/>
+          </a:prstGeom>
+          <a:noFill/>
+          <a:ln w="9525">
+            <a:noFill/>
+            <a:miter lim="800000"/>
+            <a:headEnd/>
+            <a:tailEnd/>
+          </a:ln>
+          <a:effectLst/>
+        </p:spPr>
+        <p:txBody>
+          <a:bodyPr>
+            <a:spAutoFit/>
+          </a:bodyPr>
+          <a:lstStyle/>
+          <a:p>
+            <a:pPr>
+              <a:spcBef>
+                <a:spcPct val="50000"/>
+              </a:spcBef>
+              <a:defRPr/>
+            </a:pPr>
+            <a:r>
+              <a:rPr lang="pt-PT" sz="2000" b="1" dirty="0">
+                <a:solidFill>
+                  <a:srgbClr val="C00000"/>
+                </a:solidFill>
+                <a:effectLst>
+                  <a:outerShdw blurRad="38100" dist="38100" dir="2700000" algn="tl">
+                    <a:srgbClr val="C0C0C0"/>
+                  </a:outerShdw>
+                </a:effectLst>
+                <a:latin typeface="Arial"/>
+                <a:cs typeface="Arial"/>
+              </a:rPr>
+              <a:t>■</a:t>
+            </a:r>
+            <a:r>
+              <a:rPr lang="pt-PT" sz="2000" b="1" dirty="0">
+                <a:effectLst>
+                  <a:outerShdw blurRad="38100" dist="38100" dir="2700000" algn="tl">
+                    <a:srgbClr val="C0C0C0"/>
+                  </a:outerShdw>
+                </a:effectLst>
+                <a:latin typeface="Arial"/>
+                <a:cs typeface="Arial"/>
+              </a:rPr>
+              <a:t> Ficheiro cliente.py</a:t>
+            </a:r>
+            <a:endParaRPr lang="pt-PT" sz="2000" b="1" dirty="0">
+              <a:effectLst>
+                <a:outerShdw blurRad="38100" dist="38100" dir="2700000" algn="tl">
+                  <a:srgbClr val="C0C0C0"/>
+                </a:outerShdw>
+              </a:effectLst>
+              <a:latin typeface="Arial" charset="0"/>
+            </a:endParaRPr>
+          </a:p>
+        </p:txBody>
+      </p:sp>
+      <p:sp>
+        <p:nvSpPr>
+          <p:cNvPr id="10247" name="Line 15"/>
+          <p:cNvSpPr>
+            <a:spLocks noChangeShapeType="1"/>
+          </p:cNvSpPr>
+          <p:nvPr/>
+        </p:nvSpPr>
+        <p:spPr bwMode="auto">
+          <a:xfrm>
+            <a:off x="250825" y="0"/>
+            <a:ext cx="0" cy="765175"/>
+          </a:xfrm>
+          <a:prstGeom prst="line">
+            <a:avLst/>
+          </a:prstGeom>
+          <a:noFill/>
+          <a:ln w="25400">
+            <a:solidFill>
+              <a:schemeClr val="tx1"/>
+            </a:solidFill>
+            <a:round/>
+            <a:headEnd/>
+            <a:tailEnd/>
+          </a:ln>
+        </p:spPr>
+        <p:txBody>
+          <a:bodyPr/>
+          <a:lstStyle/>
+          <a:p>
+            <a:endParaRPr lang="pt-PT"/>
+          </a:p>
+        </p:txBody>
+      </p:sp>
+      <p:sp>
+        <p:nvSpPr>
+          <p:cNvPr id="9237" name="Text Box 21"/>
+          <p:cNvSpPr txBox="1">
+            <a:spLocks noChangeArrowheads="1"/>
+          </p:cNvSpPr>
+          <p:nvPr/>
+        </p:nvSpPr>
+        <p:spPr bwMode="auto">
+          <a:xfrm>
+            <a:off x="381001" y="44450"/>
+            <a:ext cx="6138752" cy="553998"/>
+          </a:xfrm>
+          <a:prstGeom prst="rect">
+            <a:avLst/>
+          </a:prstGeom>
+          <a:noFill/>
+          <a:ln w="9525">
+            <a:noFill/>
+            <a:miter lim="800000"/>
+            <a:headEnd/>
+            <a:tailEnd/>
+          </a:ln>
+          <a:effectLst/>
+        </p:spPr>
+        <p:txBody>
+          <a:bodyPr wrap="square">
+            <a:spAutoFit/>
+          </a:bodyPr>
+          <a:lstStyle/>
+          <a:p>
+            <a:pPr>
+              <a:spcBef>
+                <a:spcPct val="50000"/>
+              </a:spcBef>
+              <a:defRPr/>
+            </a:pPr>
+            <a:r>
+              <a:rPr lang="pt-PT" sz="1200" b="1" dirty="0">
+                <a:solidFill>
+                  <a:srgbClr val="FF3300"/>
+                </a:solidFill>
+                <a:effectLst>
+                  <a:outerShdw blurRad="38100" dist="38100" dir="2700000" algn="tl">
+                    <a:srgbClr val="C0C0C0"/>
+                  </a:outerShdw>
+                </a:effectLst>
+                <a:latin typeface="Arial" charset="0"/>
+              </a:rPr>
+              <a:t>INTEGRAÇÃO DE SISTEMAS – TRABALHO PRÁTICO</a:t>
+            </a:r>
+          </a:p>
+          <a:p>
+            <a:pPr>
+              <a:spcBef>
+                <a:spcPct val="50000"/>
+              </a:spcBef>
+              <a:defRPr/>
+            </a:pPr>
+            <a:r>
+              <a:rPr lang="pt-PT" sz="1200" b="1" dirty="0">
+                <a:solidFill>
+                  <a:srgbClr val="FF3300"/>
+                </a:solidFill>
+                <a:effectLst>
+                  <a:outerShdw blurRad="38100" dist="38100" dir="2700000" algn="tl">
+                    <a:srgbClr val="C0C0C0"/>
+                  </a:outerShdw>
+                </a:effectLst>
+                <a:latin typeface="Arial" charset="0"/>
+              </a:rPr>
+              <a:t>		       - </a:t>
+            </a:r>
+            <a:r>
+              <a:rPr lang="pt-PT" sz="1000" b="1" dirty="0">
+                <a:solidFill>
+                  <a:srgbClr val="FF3300"/>
+                </a:solidFill>
+                <a:effectLst>
+                  <a:outerShdw blurRad="38100" dist="38100" dir="2700000" algn="tl">
+                    <a:srgbClr val="C0C0C0"/>
+                  </a:outerShdw>
+                </a:effectLst>
+                <a:latin typeface="Arial" charset="0"/>
+              </a:rPr>
+              <a:t>IMPLEMENTAÇÃO DE EXEMPLOS DE SOCKETS EM PYTHON</a:t>
+            </a:r>
+          </a:p>
+        </p:txBody>
+      </p:sp>
+      <p:sp>
+        <p:nvSpPr>
+          <p:cNvPr id="19" name="Marcador de Posição de Conteúdo 2"/>
+          <p:cNvSpPr txBox="1">
+            <a:spLocks/>
+          </p:cNvSpPr>
+          <p:nvPr/>
+        </p:nvSpPr>
+        <p:spPr>
+          <a:xfrm>
+            <a:off x="457200" y="1219200"/>
+            <a:ext cx="8229600" cy="4937760"/>
+          </a:xfrm>
+          <a:prstGeom prst="rect">
+            <a:avLst/>
+          </a:prstGeom>
+        </p:spPr>
+        <p:txBody>
+          <a:bodyPr vert="horz" lIns="91440" tIns="45720" rIns="91440" bIns="45720" rtlCol="0">
+            <a:normAutofit/>
+          </a:bodyPr>
+          <a:lstStyle/>
+          <a:p>
+            <a:pPr>
+              <a:lnSpc>
+                <a:spcPct val="150000"/>
+              </a:lnSpc>
+            </a:pPr>
+            <a:r>
+              <a:rPr lang="pt-PT" dirty="0">
+                <a:latin typeface="Arial" pitchFamily="34" charset="0"/>
+                <a:cs typeface="Arial" pitchFamily="34" charset="0"/>
+              </a:rPr>
+              <a:t>Registo de Evidências:</a:t>
+            </a:r>
+            <a:endParaRPr lang="en-US" dirty="0">
+              <a:latin typeface="Arial" pitchFamily="34" charset="0"/>
+              <a:cs typeface="Arial" pitchFamily="34" charset="0"/>
+            </a:endParaRPr>
+          </a:p>
+          <a:p>
+            <a:pPr>
+              <a:lnSpc>
+                <a:spcPct val="200000"/>
+              </a:lnSpc>
+              <a:spcBef>
+                <a:spcPct val="20000"/>
+              </a:spcBef>
+            </a:pPr>
+            <a:endParaRPr lang="pt-PT" sz="2000" dirty="0">
+              <a:latin typeface="Arial" pitchFamily="34" charset="0"/>
+              <a:cs typeface="Arial" pitchFamily="34" charset="0"/>
+            </a:endParaRPr>
+          </a:p>
+          <a:p>
+            <a:pPr lvl="0">
+              <a:lnSpc>
+                <a:spcPct val="200000"/>
+              </a:lnSpc>
+              <a:spcBef>
+                <a:spcPct val="20000"/>
+              </a:spcBef>
+            </a:pPr>
+            <a:endParaRPr kumimoji="0" lang="pt-PT" sz="2000" b="0" i="0" u="none" strike="noStrike" kern="1200" cap="none" spc="0" normalizeH="0" baseline="0" noProof="0" dirty="0">
+              <a:ln>
+                <a:noFill/>
+              </a:ln>
+              <a:effectLst/>
+              <a:uLnTx/>
+              <a:uFillTx/>
+              <a:latin typeface="Arial" pitchFamily="34" charset="0"/>
+              <a:cs typeface="Arial" pitchFamily="34" charset="0"/>
+            </a:endParaRPr>
+          </a:p>
+          <a:p>
+            <a:pPr marL="457200" marR="0" lvl="1" indent="0" defTabSz="914400" rtl="0" eaLnBrk="1" fontAlgn="auto" latinLnBrk="0" hangingPunct="1">
+              <a:lnSpc>
+                <a:spcPct val="200000"/>
+              </a:lnSpc>
+              <a:spcBef>
+                <a:spcPct val="20000"/>
+              </a:spcBef>
+              <a:spcAft>
+                <a:spcPts val="0"/>
+              </a:spcAft>
+              <a:buClrTx/>
+              <a:buSzTx/>
+              <a:buFont typeface="Arial" pitchFamily="34" charset="0"/>
+              <a:buNone/>
+              <a:tabLst/>
+              <a:defRPr/>
+            </a:pPr>
+            <a:endParaRPr kumimoji="0" lang="pt-PT" sz="2000" b="0" i="0" u="none" strike="noStrike" kern="1200" cap="none" spc="0" normalizeH="0" baseline="0" noProof="0" dirty="0">
+              <a:ln>
+                <a:noFill/>
+              </a:ln>
+              <a:effectLst/>
+              <a:uLnTx/>
+              <a:uFillTx/>
+              <a:latin typeface="Arial" pitchFamily="34" charset="0"/>
+              <a:cs typeface="Arial" pitchFamily="34" charset="0"/>
+            </a:endParaRPr>
+          </a:p>
+          <a:p>
+            <a:pPr marL="457200" marR="0" lvl="1" indent="0" defTabSz="914400" rtl="0" eaLnBrk="1" fontAlgn="auto" latinLnBrk="0" hangingPunct="1">
+              <a:lnSpc>
+                <a:spcPct val="200000"/>
+              </a:lnSpc>
+              <a:spcBef>
+                <a:spcPct val="20000"/>
+              </a:spcBef>
+              <a:spcAft>
+                <a:spcPts val="0"/>
+              </a:spcAft>
+              <a:buClrTx/>
+              <a:buSzTx/>
+              <a:buFont typeface="Arial" pitchFamily="34" charset="0"/>
+              <a:buNone/>
+              <a:tabLst/>
+              <a:defRPr/>
+            </a:pPr>
+            <a:endParaRPr kumimoji="0" lang="pt-PT" sz="2000" b="0" i="0" u="none" strike="noStrike" kern="1200" cap="none" spc="0" normalizeH="0" baseline="0" noProof="0" dirty="0">
+              <a:ln>
+                <a:noFill/>
+              </a:ln>
+              <a:effectLst/>
+              <a:uLnTx/>
+              <a:uFillTx/>
+              <a:latin typeface="Arial" pitchFamily="34" charset="0"/>
+              <a:cs typeface="Arial" pitchFamily="34" charset="0"/>
+            </a:endParaRPr>
+          </a:p>
+          <a:p>
+            <a:pPr marL="0" marR="0" lvl="0" indent="0" defTabSz="914400" rtl="0" eaLnBrk="1" fontAlgn="auto" latinLnBrk="0" hangingPunct="1">
+              <a:lnSpc>
+                <a:spcPct val="200000"/>
+              </a:lnSpc>
+              <a:spcBef>
+                <a:spcPct val="20000"/>
+              </a:spcBef>
+              <a:spcAft>
+                <a:spcPts val="0"/>
+              </a:spcAft>
+              <a:buClrTx/>
+              <a:buSzTx/>
+              <a:buFont typeface="Arial" pitchFamily="34" charset="0"/>
+              <a:buNone/>
+              <a:tabLst/>
+              <a:defRPr/>
+            </a:pPr>
+            <a:endParaRPr kumimoji="0" lang="pt-PT" sz="2000" b="0" i="0" u="none" strike="noStrike" kern="1200" cap="none" spc="0" normalizeH="0" baseline="0" noProof="0" dirty="0">
+              <a:ln>
+                <a:noFill/>
+              </a:ln>
+              <a:effectLst/>
+              <a:uLnTx/>
+              <a:uFillTx/>
+              <a:latin typeface="Arial" pitchFamily="34" charset="0"/>
+              <a:cs typeface="Arial" pitchFamily="34" charset="0"/>
+            </a:endParaRPr>
+          </a:p>
+          <a:p>
+            <a:pPr marL="0" marR="0" lvl="0" indent="0" defTabSz="914400" rtl="0" eaLnBrk="1" fontAlgn="auto" latinLnBrk="0" hangingPunct="1">
+              <a:lnSpc>
+                <a:spcPct val="200000"/>
+              </a:lnSpc>
+              <a:spcBef>
+                <a:spcPct val="20000"/>
+              </a:spcBef>
+              <a:spcAft>
+                <a:spcPts val="0"/>
+              </a:spcAft>
+              <a:buClrTx/>
+              <a:buSzTx/>
+              <a:buFont typeface="Arial" pitchFamily="34" charset="0"/>
+              <a:buNone/>
+              <a:tabLst/>
+              <a:defRPr/>
+            </a:pPr>
+            <a:endParaRPr kumimoji="0" lang="pt-PT" sz="2000" b="0" i="0" u="none" strike="noStrike" kern="1200" cap="none" spc="0" normalizeH="0" baseline="0" noProof="0" dirty="0">
+              <a:ln>
+                <a:noFill/>
+              </a:ln>
+              <a:effectLst/>
+              <a:uLnTx/>
+              <a:uFillTx/>
+              <a:latin typeface="Arial" pitchFamily="34" charset="0"/>
+              <a:cs typeface="Arial" pitchFamily="34" charset="0"/>
+            </a:endParaRPr>
+          </a:p>
+          <a:p>
+            <a:pPr marL="0" marR="0" lvl="0" indent="0" defTabSz="914400" rtl="0" eaLnBrk="1" fontAlgn="auto" latinLnBrk="0" hangingPunct="1">
+              <a:lnSpc>
+                <a:spcPct val="200000"/>
+              </a:lnSpc>
+              <a:spcBef>
+                <a:spcPct val="20000"/>
+              </a:spcBef>
+              <a:spcAft>
+                <a:spcPts val="0"/>
+              </a:spcAft>
+              <a:buClrTx/>
+              <a:buSzTx/>
+              <a:buFont typeface="Arial" pitchFamily="34" charset="0"/>
+              <a:buNone/>
+              <a:tabLst/>
+              <a:defRPr/>
+            </a:pPr>
+            <a:endParaRPr kumimoji="0" lang="pt-PT" sz="2000" b="0" i="0" u="none" strike="noStrike" kern="1200" cap="none" spc="0" normalizeH="0" baseline="0" noProof="0" dirty="0">
+              <a:ln>
+                <a:noFill/>
+              </a:ln>
+              <a:effectLst/>
+              <a:uLnTx/>
+              <a:uFillTx/>
+              <a:latin typeface="Arial" pitchFamily="34" charset="0"/>
+              <a:cs typeface="Arial" pitchFamily="34" charset="0"/>
+            </a:endParaRPr>
+          </a:p>
+        </p:txBody>
+      </p:sp>
+      <p:pic>
+        <p:nvPicPr>
+          <p:cNvPr id="7" name="Imagem 6">
+            <a:extLst>
+              <a:ext uri="{FF2B5EF4-FFF2-40B4-BE49-F238E27FC236}">
+                <a16:creationId xmlns:a16="http://schemas.microsoft.com/office/drawing/2014/main" id="{54D42837-E70D-4C64-A8A7-E7F751502B92}"/>
+              </a:ext>
+            </a:extLst>
+          </p:cNvPr>
+          <p:cNvPicPr>
+            <a:picLocks noChangeAspect="1"/>
+          </p:cNvPicPr>
+          <p:nvPr/>
+        </p:nvPicPr>
+        <p:blipFill>
+          <a:blip r:embed="rId3"/>
+          <a:stretch>
+            <a:fillRect/>
+          </a:stretch>
+        </p:blipFill>
+        <p:spPr>
+          <a:xfrm>
+            <a:off x="101225" y="904241"/>
+            <a:ext cx="9014192" cy="266482"/>
+          </a:xfrm>
+          <a:prstGeom prst="rect">
+            <a:avLst/>
+          </a:prstGeom>
+        </p:spPr>
+      </p:pic>
+      <p:pic>
+        <p:nvPicPr>
+          <p:cNvPr id="9" name="Imagem 8">
+            <a:extLst>
+              <a:ext uri="{FF2B5EF4-FFF2-40B4-BE49-F238E27FC236}">
+                <a16:creationId xmlns:a16="http://schemas.microsoft.com/office/drawing/2014/main" id="{81982921-1900-46B5-BE82-07BECCD63918}"/>
+              </a:ext>
+            </a:extLst>
+          </p:cNvPr>
+          <p:cNvPicPr>
+            <a:picLocks noChangeAspect="1"/>
+          </p:cNvPicPr>
+          <p:nvPr/>
+        </p:nvPicPr>
+        <p:blipFill>
+          <a:blip r:embed="rId4"/>
+          <a:stretch>
+            <a:fillRect/>
+          </a:stretch>
+        </p:blipFill>
+        <p:spPr>
+          <a:xfrm>
+            <a:off x="0" y="6320212"/>
+            <a:ext cx="9144000" cy="253252"/>
+          </a:xfrm>
+          <a:prstGeom prst="rect">
+            <a:avLst/>
+          </a:prstGeom>
+        </p:spPr>
+      </p:pic>
+      <p:pic>
+        <p:nvPicPr>
+          <p:cNvPr id="13" name="Imagem 12">
+            <a:extLst>
+              <a:ext uri="{FF2B5EF4-FFF2-40B4-BE49-F238E27FC236}">
+                <a16:creationId xmlns:a16="http://schemas.microsoft.com/office/drawing/2014/main" id="{BE263CB9-5E3B-4385-9450-974CDF0F6C7D}"/>
+              </a:ext>
+            </a:extLst>
+          </p:cNvPr>
+          <p:cNvPicPr>
+            <a:picLocks noChangeAspect="1"/>
+          </p:cNvPicPr>
+          <p:nvPr/>
+        </p:nvPicPr>
+        <p:blipFill>
+          <a:blip r:embed="rId5" cstate="print">
+            <a:extLst>
+              <a:ext uri="{28A0092B-C50C-407E-A947-70E740481C1C}">
+                <a14:useLocalDpi xmlns:a14="http://schemas.microsoft.com/office/drawing/2010/main" val="0"/>
+              </a:ext>
+            </a:extLst>
+          </a:blip>
+          <a:stretch>
+            <a:fillRect/>
+          </a:stretch>
+        </p:blipFill>
+        <p:spPr>
+          <a:xfrm>
+            <a:off x="238125" y="6488336"/>
+            <a:ext cx="545959" cy="199802"/>
+          </a:xfrm>
+          <a:prstGeom prst="rect">
+            <a:avLst/>
+          </a:prstGeom>
+        </p:spPr>
+      </p:pic>
+      <p:sp>
+        <p:nvSpPr>
+          <p:cNvPr id="3" name="Rectângulo 19">
+            <a:extLst>
+              <a:ext uri="{FF2B5EF4-FFF2-40B4-BE49-F238E27FC236}">
+                <a16:creationId xmlns:a16="http://schemas.microsoft.com/office/drawing/2014/main" id="{850208AF-C5A5-C009-177D-8C27BB5DCC8B}"/>
+              </a:ext>
+            </a:extLst>
+          </p:cNvPr>
+          <p:cNvSpPr/>
+          <p:nvPr/>
+        </p:nvSpPr>
+        <p:spPr>
+          <a:xfrm>
+            <a:off x="5535613" y="553019"/>
+            <a:ext cx="3505200" cy="261610"/>
+          </a:xfrm>
+          <a:prstGeom prst="rect">
+            <a:avLst/>
+          </a:prstGeom>
+        </p:spPr>
+        <p:txBody>
+          <a:bodyPr wrap="square">
+            <a:spAutoFit/>
+          </a:bodyPr>
+          <a:lstStyle/>
+          <a:p>
+            <a:pPr algn="r"/>
+            <a:r>
+              <a:rPr lang="pt-PT" sz="1100" b="1" cap="all" dirty="0" err="1">
+                <a:highlight>
+                  <a:srgbClr val="FFFF00"/>
+                </a:highlight>
+              </a:rPr>
+              <a:t>Degree</a:t>
+            </a:r>
+            <a:r>
+              <a:rPr lang="pt-PT" sz="1100" b="1" cap="all" dirty="0">
+                <a:highlight>
+                  <a:srgbClr val="FFFF00"/>
+                </a:highlight>
+              </a:rPr>
+              <a:t> IN </a:t>
+            </a:r>
+            <a:r>
+              <a:rPr lang="pt-PT" sz="1100" b="1" cap="all" dirty="0" err="1">
+                <a:highlight>
+                  <a:srgbClr val="FFFF00"/>
+                </a:highlight>
+              </a:rPr>
+              <a:t>Informatics</a:t>
+            </a:r>
+            <a:r>
+              <a:rPr lang="pt-PT" sz="1100" b="1" cap="all" dirty="0">
+                <a:highlight>
+                  <a:srgbClr val="FFFF00"/>
+                </a:highlight>
+              </a:rPr>
+              <a:t> </a:t>
+            </a:r>
+            <a:r>
+              <a:rPr lang="pt-PT" sz="1100" b="1" cap="all" dirty="0" err="1">
+                <a:highlight>
+                  <a:srgbClr val="FFFF00"/>
+                </a:highlight>
+              </a:rPr>
+              <a:t>engineering</a:t>
+            </a:r>
+            <a:endParaRPr lang="pt-PT" sz="1100" dirty="0">
+              <a:highlight>
+                <a:srgbClr val="FFFF00"/>
+              </a:highlight>
+            </a:endParaRPr>
+          </a:p>
+        </p:txBody>
+      </p:sp>
+      <p:pic>
+        <p:nvPicPr>
+          <p:cNvPr id="5" name="Imagem 4">
+            <a:extLst>
+              <a:ext uri="{FF2B5EF4-FFF2-40B4-BE49-F238E27FC236}">
+                <a16:creationId xmlns:a16="http://schemas.microsoft.com/office/drawing/2014/main" id="{4B69841B-4743-42E9-837A-73B87FC5C8CF}"/>
+              </a:ext>
+            </a:extLst>
+          </p:cNvPr>
+          <p:cNvPicPr>
+            <a:picLocks noChangeAspect="1"/>
+          </p:cNvPicPr>
+          <p:nvPr/>
+        </p:nvPicPr>
+        <p:blipFill>
+          <a:blip r:embed="rId6" cstate="print">
+            <a:extLst>
+              <a:ext uri="{28A0092B-C50C-407E-A947-70E740481C1C}">
+                <a14:useLocalDpi xmlns:a14="http://schemas.microsoft.com/office/drawing/2010/main" val="0"/>
+              </a:ext>
+            </a:extLst>
+          </a:blip>
+          <a:stretch>
+            <a:fillRect/>
+          </a:stretch>
+        </p:blipFill>
+        <p:spPr>
+          <a:xfrm>
+            <a:off x="6575316" y="9186"/>
+            <a:ext cx="2575034" cy="639880"/>
+          </a:xfrm>
+          <a:prstGeom prst="rect">
+            <a:avLst/>
+          </a:prstGeom>
+        </p:spPr>
+      </p:pic>
+      <p:sp>
+        <p:nvSpPr>
+          <p:cNvPr id="4" name="Subtítulo 2">
+            <a:extLst>
+              <a:ext uri="{FF2B5EF4-FFF2-40B4-BE49-F238E27FC236}">
+                <a16:creationId xmlns:a16="http://schemas.microsoft.com/office/drawing/2014/main" id="{0F443CA8-A853-9EB3-2038-4F6563C023F0}"/>
+              </a:ext>
+            </a:extLst>
+          </p:cNvPr>
+          <p:cNvSpPr txBox="1">
+            <a:spLocks/>
+          </p:cNvSpPr>
+          <p:nvPr/>
+        </p:nvSpPr>
+        <p:spPr>
+          <a:xfrm>
+            <a:off x="836017" y="6524516"/>
+            <a:ext cx="7698382" cy="162409"/>
+          </a:xfrm>
+          <a:prstGeom prst="rect">
+            <a:avLst/>
+          </a:prstGeom>
+        </p:spPr>
+        <p:txBody>
+          <a:bodyPr vert="horz" lIns="68580" tIns="34290" rIns="68580" bIns="34290" rtlCol="0">
+            <a:normAutofit fontScale="92500" lnSpcReduction="20000"/>
+          </a:bodyPr>
+          <a:lstStyle>
+            <a:lvl1pPr marL="0" indent="0" algn="ctr" defTabSz="914400" rtl="0" eaLnBrk="1" latinLnBrk="0" hangingPunct="1">
+              <a:lnSpc>
+                <a:spcPct val="90000"/>
+              </a:lnSpc>
+              <a:spcBef>
+                <a:spcPts val="1000"/>
+              </a:spcBef>
+              <a:buFont typeface="Arial" panose="020B0604020202020204" pitchFamily="34" charset="0"/>
+              <a:buNone/>
+              <a:defRPr sz="2400" kern="1200">
+                <a:solidFill>
+                  <a:schemeClr val="tx1"/>
+                </a:solidFill>
+                <a:latin typeface="+mn-lt"/>
+                <a:ea typeface="+mn-ea"/>
+                <a:cs typeface="+mn-cs"/>
+              </a:defRPr>
+            </a:lvl1pPr>
+            <a:lvl2pPr marL="457200" indent="0" algn="ctr" defTabSz="914400" rtl="0" eaLnBrk="1" latinLnBrk="0" hangingPunct="1">
+              <a:lnSpc>
+                <a:spcPct val="90000"/>
+              </a:lnSpc>
+              <a:spcBef>
+                <a:spcPts val="500"/>
+              </a:spcBef>
+              <a:buFont typeface="Arial" panose="020B0604020202020204" pitchFamily="34" charset="0"/>
+              <a:buNone/>
+              <a:defRPr sz="2000" kern="1200">
+                <a:solidFill>
+                  <a:schemeClr val="tx1"/>
+                </a:solidFill>
+                <a:latin typeface="+mn-lt"/>
+                <a:ea typeface="+mn-ea"/>
+                <a:cs typeface="+mn-cs"/>
+              </a:defRPr>
+            </a:lvl2pPr>
+            <a:lvl3pPr marL="914400" indent="0" algn="ctr" defTabSz="914400" rtl="0" eaLnBrk="1" latinLnBrk="0" hangingPunct="1">
+              <a:lnSpc>
+                <a:spcPct val="90000"/>
+              </a:lnSpc>
+              <a:spcBef>
+                <a:spcPts val="500"/>
+              </a:spcBef>
+              <a:buFont typeface="Arial" panose="020B0604020202020204" pitchFamily="34" charset="0"/>
+              <a:buNone/>
+              <a:defRPr sz="1800" kern="1200">
+                <a:solidFill>
+                  <a:schemeClr val="tx1"/>
+                </a:solidFill>
+                <a:latin typeface="+mn-lt"/>
+                <a:ea typeface="+mn-ea"/>
+                <a:cs typeface="+mn-cs"/>
+              </a:defRPr>
+            </a:lvl3pPr>
+            <a:lvl4pPr marL="1371600" indent="0" algn="ctr" defTabSz="914400" rtl="0" eaLnBrk="1" latinLnBrk="0" hangingPunct="1">
+              <a:lnSpc>
+                <a:spcPct val="90000"/>
+              </a:lnSpc>
+              <a:spcBef>
+                <a:spcPts val="500"/>
+              </a:spcBef>
+              <a:buFont typeface="Arial" panose="020B0604020202020204" pitchFamily="34" charset="0"/>
+              <a:buNone/>
+              <a:defRPr sz="1600" kern="1200">
+                <a:solidFill>
+                  <a:schemeClr val="tx1"/>
+                </a:solidFill>
+                <a:latin typeface="+mn-lt"/>
+                <a:ea typeface="+mn-ea"/>
+                <a:cs typeface="+mn-cs"/>
+              </a:defRPr>
+            </a:lvl4pPr>
+            <a:lvl5pPr marL="1828800" indent="0" algn="ctr" defTabSz="914400" rtl="0" eaLnBrk="1" latinLnBrk="0" hangingPunct="1">
+              <a:lnSpc>
+                <a:spcPct val="90000"/>
+              </a:lnSpc>
+              <a:spcBef>
+                <a:spcPts val="500"/>
+              </a:spcBef>
+              <a:buFont typeface="Arial" panose="020B0604020202020204" pitchFamily="34" charset="0"/>
+              <a:buNone/>
+              <a:defRPr sz="1600" kern="1200">
+                <a:solidFill>
+                  <a:schemeClr val="tx1"/>
+                </a:solidFill>
+                <a:latin typeface="+mn-lt"/>
+                <a:ea typeface="+mn-ea"/>
+                <a:cs typeface="+mn-cs"/>
+              </a:defRPr>
+            </a:lvl5pPr>
+            <a:lvl6pPr marL="2286000" indent="0" algn="ctr" defTabSz="914400" rtl="0" eaLnBrk="1" latinLnBrk="0" hangingPunct="1">
+              <a:lnSpc>
+                <a:spcPct val="90000"/>
+              </a:lnSpc>
+              <a:spcBef>
+                <a:spcPts val="500"/>
+              </a:spcBef>
+              <a:buFont typeface="Arial" panose="020B0604020202020204" pitchFamily="34" charset="0"/>
+              <a:buNone/>
+              <a:defRPr sz="1600" kern="1200">
+                <a:solidFill>
+                  <a:schemeClr val="tx1"/>
+                </a:solidFill>
+                <a:latin typeface="+mn-lt"/>
+                <a:ea typeface="+mn-ea"/>
+                <a:cs typeface="+mn-cs"/>
+              </a:defRPr>
+            </a:lvl6pPr>
+            <a:lvl7pPr marL="2743200" indent="0" algn="ctr" defTabSz="914400" rtl="0" eaLnBrk="1" latinLnBrk="0" hangingPunct="1">
+              <a:lnSpc>
+                <a:spcPct val="90000"/>
+              </a:lnSpc>
+              <a:spcBef>
+                <a:spcPts val="500"/>
+              </a:spcBef>
+              <a:buFont typeface="Arial" panose="020B0604020202020204" pitchFamily="34" charset="0"/>
+              <a:buNone/>
+              <a:defRPr sz="1600" kern="1200">
+                <a:solidFill>
+                  <a:schemeClr val="tx1"/>
+                </a:solidFill>
+                <a:latin typeface="+mn-lt"/>
+                <a:ea typeface="+mn-ea"/>
+                <a:cs typeface="+mn-cs"/>
+              </a:defRPr>
+            </a:lvl7pPr>
+            <a:lvl8pPr marL="3200400" indent="0" algn="ctr" defTabSz="914400" rtl="0" eaLnBrk="1" latinLnBrk="0" hangingPunct="1">
+              <a:lnSpc>
+                <a:spcPct val="90000"/>
+              </a:lnSpc>
+              <a:spcBef>
+                <a:spcPts val="500"/>
+              </a:spcBef>
+              <a:buFont typeface="Arial" panose="020B0604020202020204" pitchFamily="34" charset="0"/>
+              <a:buNone/>
+              <a:defRPr sz="1600" kern="1200">
+                <a:solidFill>
+                  <a:schemeClr val="tx1"/>
+                </a:solidFill>
+                <a:latin typeface="+mn-lt"/>
+                <a:ea typeface="+mn-ea"/>
+                <a:cs typeface="+mn-cs"/>
+              </a:defRPr>
+            </a:lvl8pPr>
+            <a:lvl9pPr marL="3657600" indent="0" algn="ctr" defTabSz="914400" rtl="0" eaLnBrk="1" latinLnBrk="0" hangingPunct="1">
+              <a:lnSpc>
+                <a:spcPct val="90000"/>
+              </a:lnSpc>
+              <a:spcBef>
+                <a:spcPts val="500"/>
+              </a:spcBef>
+              <a:buFont typeface="Arial" panose="020B0604020202020204" pitchFamily="34" charset="0"/>
+              <a:buNone/>
+              <a:defRPr sz="1600" kern="1200">
+                <a:solidFill>
+                  <a:schemeClr val="tx1"/>
+                </a:solidFill>
+                <a:latin typeface="+mn-lt"/>
+                <a:ea typeface="+mn-ea"/>
+                <a:cs typeface="+mn-cs"/>
+              </a:defRPr>
+            </a:lvl9pPr>
+          </a:lstStyle>
+          <a:p>
+            <a:pPr algn="l"/>
+            <a:r>
+              <a:rPr lang="pt-PT" sz="900" dirty="0">
+                <a:latin typeface="Arial" charset="0"/>
+                <a:ea typeface="Arial" charset="0"/>
+                <a:cs typeface="Arial" charset="0"/>
+              </a:rPr>
+              <a:t>@Diogo Reis, Diogo Pinheiro| </a:t>
+            </a:r>
+            <a:r>
+              <a:rPr lang="pt-PT" sz="900" b="1" dirty="0">
+                <a:solidFill>
+                  <a:srgbClr val="C00000"/>
+                </a:solidFill>
+                <a:latin typeface="Arial" charset="0"/>
+                <a:ea typeface="Arial" charset="0"/>
+                <a:cs typeface="Arial" charset="0"/>
+              </a:rPr>
+              <a:t>Unidade Curricular: INTEGRAÇÃO DE SISTEMAS </a:t>
+            </a:r>
+            <a:r>
+              <a:rPr lang="pt-PT" sz="900" dirty="0">
+                <a:latin typeface="Arial" charset="0"/>
+                <a:ea typeface="Arial" charset="0"/>
+                <a:cs typeface="Arial" charset="0"/>
+              </a:rPr>
+              <a:t>– Ano Letivo 2023/2024 – </a:t>
+            </a:r>
+            <a:r>
+              <a:rPr lang="pt-PT" sz="900" b="1" dirty="0">
+                <a:latin typeface="Arial" charset="0"/>
+                <a:ea typeface="Arial" charset="0"/>
+                <a:cs typeface="Arial" charset="0"/>
+              </a:rPr>
+              <a:t>Trabalho Prático</a:t>
+            </a:r>
+          </a:p>
+        </p:txBody>
+      </p:sp>
+      <p:pic>
+        <p:nvPicPr>
+          <p:cNvPr id="6" name="Imagem 5">
+            <a:extLst>
+              <a:ext uri="{FF2B5EF4-FFF2-40B4-BE49-F238E27FC236}">
+                <a16:creationId xmlns:a16="http://schemas.microsoft.com/office/drawing/2014/main" id="{EA7EE4C8-A4A2-2418-262E-0CBE021E3A99}"/>
+              </a:ext>
+            </a:extLst>
+          </p:cNvPr>
+          <p:cNvPicPr>
+            <a:picLocks noChangeAspect="1"/>
+          </p:cNvPicPr>
+          <p:nvPr/>
+        </p:nvPicPr>
+        <p:blipFill rotWithShape="1">
+          <a:blip r:embed="rId7"/>
+          <a:srcRect l="2388" r="6101"/>
+          <a:stretch/>
+        </p:blipFill>
+        <p:spPr>
+          <a:xfrm>
+            <a:off x="4267200" y="1727477"/>
+            <a:ext cx="4572000" cy="3921206"/>
+          </a:xfrm>
+          <a:prstGeom prst="rect">
+            <a:avLst/>
+          </a:prstGeom>
+        </p:spPr>
+      </p:pic>
     </p:spTree>
     <p:extLst>
       <p:ext uri="{BB962C8B-B14F-4D97-AF65-F5344CB8AC3E}">
@@ -7274,7 +9607,1009 @@
 </p:sld>
 </file>
 
-<file path=ppt/slides/slide4.xml><?xml version="1.0" encoding="utf-8"?>
+<file path=ppt/slides/slide6.xml><?xml version="1.0" encoding="utf-8"?>
+<p:sld xmlns:a="http://schemas.openxmlformats.org/drawingml/2006/main" xmlns:r="http://schemas.openxmlformats.org/officeDocument/2006/relationships" xmlns:p="http://schemas.openxmlformats.org/presentationml/2006/main">
+  <p:cSld>
+    <p:spTree>
+      <p:nvGrpSpPr>
+        <p:cNvPr id="1" name=""/>
+        <p:cNvGrpSpPr/>
+        <p:nvPr/>
+      </p:nvGrpSpPr>
+      <p:grpSpPr>
+        <a:xfrm>
+          <a:off x="0" y="0"/>
+          <a:ext cx="0" cy="0"/>
+          <a:chOff x="0" y="0"/>
+          <a:chExt cx="0" cy="0"/>
+        </a:xfrm>
+      </p:grpSpPr>
+      <p:sp>
+        <p:nvSpPr>
+          <p:cNvPr id="10243" name="Text Box 10"/>
+          <p:cNvSpPr txBox="1">
+            <a:spLocks noChangeArrowheads="1"/>
+          </p:cNvSpPr>
+          <p:nvPr/>
+        </p:nvSpPr>
+        <p:spPr bwMode="auto">
+          <a:xfrm>
+            <a:off x="8288338" y="6296025"/>
+            <a:ext cx="827087" cy="366713"/>
+          </a:xfrm>
+          <a:prstGeom prst="rect">
+            <a:avLst/>
+          </a:prstGeom>
+          <a:noFill/>
+          <a:ln w="9525">
+            <a:noFill/>
+            <a:miter lim="800000"/>
+            <a:headEnd/>
+            <a:tailEnd/>
+          </a:ln>
+        </p:spPr>
+        <p:txBody>
+          <a:bodyPr>
+            <a:spAutoFit/>
+          </a:bodyPr>
+          <a:lstStyle/>
+          <a:p>
+            <a:pPr>
+              <a:spcBef>
+                <a:spcPct val="50000"/>
+              </a:spcBef>
+            </a:pPr>
+            <a:endParaRPr lang="pt-PT"/>
+          </a:p>
+        </p:txBody>
+      </p:sp>
+      <p:sp>
+        <p:nvSpPr>
+          <p:cNvPr id="10244" name="Rectangle 11"/>
+          <p:cNvSpPr>
+            <a:spLocks noChangeArrowheads="1"/>
+          </p:cNvSpPr>
+          <p:nvPr/>
+        </p:nvSpPr>
+        <p:spPr bwMode="auto">
+          <a:xfrm>
+            <a:off x="8327571" y="6496091"/>
+            <a:ext cx="936625" cy="260350"/>
+          </a:xfrm>
+          <a:prstGeom prst="rect">
+            <a:avLst/>
+          </a:prstGeom>
+          <a:noFill/>
+          <a:ln w="9525">
+            <a:noFill/>
+            <a:miter lim="800000"/>
+            <a:headEnd/>
+            <a:tailEnd/>
+          </a:ln>
+        </p:spPr>
+        <p:txBody>
+          <a:bodyPr anchor="ctr"/>
+          <a:lstStyle/>
+          <a:p>
+            <a:pPr algn="ctr"/>
+            <a:r>
+              <a:rPr lang="pt-PT" sz="1000" dirty="0"/>
+              <a:t>- </a:t>
+            </a:r>
+            <a:fld id="{1234D2FF-8FB9-47A1-B8C9-42A5F500BA2F}" type="slidenum">
+              <a:rPr lang="pt-PT" sz="1000"/>
+              <a:pPr algn="ctr"/>
+              <a:t>6</a:t>
+            </a:fld>
+            <a:r>
+              <a:rPr lang="pt-PT" sz="1000" dirty="0"/>
+              <a:t> -</a:t>
+            </a:r>
+          </a:p>
+        </p:txBody>
+      </p:sp>
+      <p:sp>
+        <p:nvSpPr>
+          <p:cNvPr id="9229" name="Text Box 13"/>
+          <p:cNvSpPr txBox="1">
+            <a:spLocks noChangeArrowheads="1"/>
+          </p:cNvSpPr>
+          <p:nvPr/>
+        </p:nvSpPr>
+        <p:spPr bwMode="auto">
+          <a:xfrm>
+            <a:off x="306388" y="557213"/>
+            <a:ext cx="6981825" cy="400050"/>
+          </a:xfrm>
+          <a:prstGeom prst="rect">
+            <a:avLst/>
+          </a:prstGeom>
+          <a:noFill/>
+          <a:ln w="9525">
+            <a:noFill/>
+            <a:miter lim="800000"/>
+            <a:headEnd/>
+            <a:tailEnd/>
+          </a:ln>
+          <a:effectLst/>
+        </p:spPr>
+        <p:txBody>
+          <a:bodyPr>
+            <a:spAutoFit/>
+          </a:bodyPr>
+          <a:lstStyle/>
+          <a:p>
+            <a:pPr>
+              <a:spcBef>
+                <a:spcPct val="50000"/>
+              </a:spcBef>
+              <a:defRPr/>
+            </a:pPr>
+            <a:r>
+              <a:rPr lang="pt-PT" sz="2000" b="1" dirty="0">
+                <a:solidFill>
+                  <a:srgbClr val="C00000"/>
+                </a:solidFill>
+                <a:effectLst>
+                  <a:outerShdw blurRad="38100" dist="38100" dir="2700000" algn="tl">
+                    <a:srgbClr val="C0C0C0"/>
+                  </a:outerShdw>
+                </a:effectLst>
+                <a:latin typeface="Arial"/>
+                <a:cs typeface="Arial"/>
+              </a:rPr>
+              <a:t>■</a:t>
+            </a:r>
+            <a:r>
+              <a:rPr lang="pt-PT" sz="2000" b="1" dirty="0">
+                <a:effectLst>
+                  <a:outerShdw blurRad="38100" dist="38100" dir="2700000" algn="tl">
+                    <a:srgbClr val="C0C0C0"/>
+                  </a:outerShdw>
+                </a:effectLst>
+                <a:latin typeface="Arial"/>
+                <a:cs typeface="Arial"/>
+              </a:rPr>
+              <a:t> Ficheiro cliente.py</a:t>
+            </a:r>
+            <a:endParaRPr lang="pt-PT" sz="2000" b="1" dirty="0">
+              <a:effectLst>
+                <a:outerShdw blurRad="38100" dist="38100" dir="2700000" algn="tl">
+                  <a:srgbClr val="C0C0C0"/>
+                </a:outerShdw>
+              </a:effectLst>
+              <a:latin typeface="Arial" charset="0"/>
+            </a:endParaRPr>
+          </a:p>
+        </p:txBody>
+      </p:sp>
+      <p:sp>
+        <p:nvSpPr>
+          <p:cNvPr id="10247" name="Line 15"/>
+          <p:cNvSpPr>
+            <a:spLocks noChangeShapeType="1"/>
+          </p:cNvSpPr>
+          <p:nvPr/>
+        </p:nvSpPr>
+        <p:spPr bwMode="auto">
+          <a:xfrm>
+            <a:off x="250825" y="0"/>
+            <a:ext cx="0" cy="765175"/>
+          </a:xfrm>
+          <a:prstGeom prst="line">
+            <a:avLst/>
+          </a:prstGeom>
+          <a:noFill/>
+          <a:ln w="25400">
+            <a:solidFill>
+              <a:schemeClr val="tx1"/>
+            </a:solidFill>
+            <a:round/>
+            <a:headEnd/>
+            <a:tailEnd/>
+          </a:ln>
+        </p:spPr>
+        <p:txBody>
+          <a:bodyPr/>
+          <a:lstStyle/>
+          <a:p>
+            <a:endParaRPr lang="pt-PT"/>
+          </a:p>
+        </p:txBody>
+      </p:sp>
+      <p:sp>
+        <p:nvSpPr>
+          <p:cNvPr id="9237" name="Text Box 21"/>
+          <p:cNvSpPr txBox="1">
+            <a:spLocks noChangeArrowheads="1"/>
+          </p:cNvSpPr>
+          <p:nvPr/>
+        </p:nvSpPr>
+        <p:spPr bwMode="auto">
+          <a:xfrm>
+            <a:off x="381001" y="44450"/>
+            <a:ext cx="6138752" cy="553998"/>
+          </a:xfrm>
+          <a:prstGeom prst="rect">
+            <a:avLst/>
+          </a:prstGeom>
+          <a:noFill/>
+          <a:ln w="9525">
+            <a:noFill/>
+            <a:miter lim="800000"/>
+            <a:headEnd/>
+            <a:tailEnd/>
+          </a:ln>
+          <a:effectLst/>
+        </p:spPr>
+        <p:txBody>
+          <a:bodyPr wrap="square">
+            <a:spAutoFit/>
+          </a:bodyPr>
+          <a:lstStyle/>
+          <a:p>
+            <a:pPr>
+              <a:spcBef>
+                <a:spcPct val="50000"/>
+              </a:spcBef>
+              <a:defRPr/>
+            </a:pPr>
+            <a:r>
+              <a:rPr lang="pt-PT" sz="1200" b="1" dirty="0">
+                <a:solidFill>
+                  <a:srgbClr val="FF3300"/>
+                </a:solidFill>
+                <a:effectLst>
+                  <a:outerShdw blurRad="38100" dist="38100" dir="2700000" algn="tl">
+                    <a:srgbClr val="C0C0C0"/>
+                  </a:outerShdw>
+                </a:effectLst>
+                <a:latin typeface="Arial" charset="0"/>
+              </a:rPr>
+              <a:t>INTEGRAÇÃO DE SISTEMAS – TRABALHO PRÁTICO</a:t>
+            </a:r>
+          </a:p>
+          <a:p>
+            <a:pPr>
+              <a:spcBef>
+                <a:spcPct val="50000"/>
+              </a:spcBef>
+              <a:defRPr/>
+            </a:pPr>
+            <a:r>
+              <a:rPr lang="pt-PT" sz="1200" b="1" dirty="0">
+                <a:solidFill>
+                  <a:srgbClr val="FF3300"/>
+                </a:solidFill>
+                <a:effectLst>
+                  <a:outerShdw blurRad="38100" dist="38100" dir="2700000" algn="tl">
+                    <a:srgbClr val="C0C0C0"/>
+                  </a:outerShdw>
+                </a:effectLst>
+                <a:latin typeface="Arial" charset="0"/>
+              </a:rPr>
+              <a:t>		       - </a:t>
+            </a:r>
+            <a:r>
+              <a:rPr lang="pt-PT" sz="1000" b="1" dirty="0">
+                <a:solidFill>
+                  <a:srgbClr val="FF3300"/>
+                </a:solidFill>
+                <a:effectLst>
+                  <a:outerShdw blurRad="38100" dist="38100" dir="2700000" algn="tl">
+                    <a:srgbClr val="C0C0C0"/>
+                  </a:outerShdw>
+                </a:effectLst>
+                <a:latin typeface="Arial" charset="0"/>
+              </a:rPr>
+              <a:t>IMPLEMENTAÇÃO DE EXEMPLOS DE SOCKETS EM PYTHON</a:t>
+            </a:r>
+          </a:p>
+        </p:txBody>
+      </p:sp>
+      <p:sp>
+        <p:nvSpPr>
+          <p:cNvPr id="19" name="Marcador de Posição de Conteúdo 2"/>
+          <p:cNvSpPr txBox="1">
+            <a:spLocks/>
+          </p:cNvSpPr>
+          <p:nvPr/>
+        </p:nvSpPr>
+        <p:spPr>
+          <a:xfrm>
+            <a:off x="457200" y="1219200"/>
+            <a:ext cx="8229600" cy="4937760"/>
+          </a:xfrm>
+          <a:prstGeom prst="rect">
+            <a:avLst/>
+          </a:prstGeom>
+        </p:spPr>
+        <p:txBody>
+          <a:bodyPr vert="horz" lIns="91440" tIns="45720" rIns="91440" bIns="45720" rtlCol="0">
+            <a:normAutofit/>
+          </a:bodyPr>
+          <a:lstStyle/>
+          <a:p>
+            <a:pPr>
+              <a:lnSpc>
+                <a:spcPct val="150000"/>
+              </a:lnSpc>
+            </a:pPr>
+            <a:r>
+              <a:rPr lang="pt-PT" dirty="0">
+                <a:latin typeface="Arial" pitchFamily="34" charset="0"/>
+                <a:cs typeface="Arial" pitchFamily="34" charset="0"/>
+              </a:rPr>
+              <a:t>Registo de Evidências:</a:t>
+            </a:r>
+            <a:endParaRPr lang="en-US" dirty="0">
+              <a:latin typeface="Arial" pitchFamily="34" charset="0"/>
+              <a:cs typeface="Arial" pitchFamily="34" charset="0"/>
+            </a:endParaRPr>
+          </a:p>
+          <a:p>
+            <a:pPr>
+              <a:lnSpc>
+                <a:spcPct val="200000"/>
+              </a:lnSpc>
+              <a:spcBef>
+                <a:spcPct val="20000"/>
+              </a:spcBef>
+            </a:pPr>
+            <a:endParaRPr lang="pt-PT" sz="2000" dirty="0">
+              <a:latin typeface="Arial" pitchFamily="34" charset="0"/>
+              <a:cs typeface="Arial" pitchFamily="34" charset="0"/>
+            </a:endParaRPr>
+          </a:p>
+          <a:p>
+            <a:pPr lvl="0">
+              <a:lnSpc>
+                <a:spcPct val="200000"/>
+              </a:lnSpc>
+              <a:spcBef>
+                <a:spcPct val="20000"/>
+              </a:spcBef>
+            </a:pPr>
+            <a:endParaRPr kumimoji="0" lang="pt-PT" sz="2000" b="0" i="0" u="none" strike="noStrike" kern="1200" cap="none" spc="0" normalizeH="0" baseline="0" noProof="0" dirty="0">
+              <a:ln>
+                <a:noFill/>
+              </a:ln>
+              <a:effectLst/>
+              <a:uLnTx/>
+              <a:uFillTx/>
+              <a:latin typeface="Arial" pitchFamily="34" charset="0"/>
+              <a:cs typeface="Arial" pitchFamily="34" charset="0"/>
+            </a:endParaRPr>
+          </a:p>
+          <a:p>
+            <a:pPr marL="457200" marR="0" lvl="1" indent="0" defTabSz="914400" rtl="0" eaLnBrk="1" fontAlgn="auto" latinLnBrk="0" hangingPunct="1">
+              <a:lnSpc>
+                <a:spcPct val="200000"/>
+              </a:lnSpc>
+              <a:spcBef>
+                <a:spcPct val="20000"/>
+              </a:spcBef>
+              <a:spcAft>
+                <a:spcPts val="0"/>
+              </a:spcAft>
+              <a:buClrTx/>
+              <a:buSzTx/>
+              <a:buFont typeface="Arial" pitchFamily="34" charset="0"/>
+              <a:buNone/>
+              <a:tabLst/>
+              <a:defRPr/>
+            </a:pPr>
+            <a:endParaRPr kumimoji="0" lang="pt-PT" sz="2000" b="0" i="0" u="none" strike="noStrike" kern="1200" cap="none" spc="0" normalizeH="0" baseline="0" noProof="0" dirty="0">
+              <a:ln>
+                <a:noFill/>
+              </a:ln>
+              <a:effectLst/>
+              <a:uLnTx/>
+              <a:uFillTx/>
+              <a:latin typeface="Arial" pitchFamily="34" charset="0"/>
+              <a:cs typeface="Arial" pitchFamily="34" charset="0"/>
+            </a:endParaRPr>
+          </a:p>
+          <a:p>
+            <a:pPr marL="457200" marR="0" lvl="1" indent="0" defTabSz="914400" rtl="0" eaLnBrk="1" fontAlgn="auto" latinLnBrk="0" hangingPunct="1">
+              <a:lnSpc>
+                <a:spcPct val="200000"/>
+              </a:lnSpc>
+              <a:spcBef>
+                <a:spcPct val="20000"/>
+              </a:spcBef>
+              <a:spcAft>
+                <a:spcPts val="0"/>
+              </a:spcAft>
+              <a:buClrTx/>
+              <a:buSzTx/>
+              <a:buFont typeface="Arial" pitchFamily="34" charset="0"/>
+              <a:buNone/>
+              <a:tabLst/>
+              <a:defRPr/>
+            </a:pPr>
+            <a:endParaRPr kumimoji="0" lang="pt-PT" sz="2000" b="0" i="0" u="none" strike="noStrike" kern="1200" cap="none" spc="0" normalizeH="0" baseline="0" noProof="0" dirty="0">
+              <a:ln>
+                <a:noFill/>
+              </a:ln>
+              <a:effectLst/>
+              <a:uLnTx/>
+              <a:uFillTx/>
+              <a:latin typeface="Arial" pitchFamily="34" charset="0"/>
+              <a:cs typeface="Arial" pitchFamily="34" charset="0"/>
+            </a:endParaRPr>
+          </a:p>
+          <a:p>
+            <a:pPr marL="0" marR="0" lvl="0" indent="0" defTabSz="914400" rtl="0" eaLnBrk="1" fontAlgn="auto" latinLnBrk="0" hangingPunct="1">
+              <a:lnSpc>
+                <a:spcPct val="200000"/>
+              </a:lnSpc>
+              <a:spcBef>
+                <a:spcPct val="20000"/>
+              </a:spcBef>
+              <a:spcAft>
+                <a:spcPts val="0"/>
+              </a:spcAft>
+              <a:buClrTx/>
+              <a:buSzTx/>
+              <a:buFont typeface="Arial" pitchFamily="34" charset="0"/>
+              <a:buNone/>
+              <a:tabLst/>
+              <a:defRPr/>
+            </a:pPr>
+            <a:endParaRPr kumimoji="0" lang="pt-PT" sz="2000" b="0" i="0" u="none" strike="noStrike" kern="1200" cap="none" spc="0" normalizeH="0" baseline="0" noProof="0" dirty="0">
+              <a:ln>
+                <a:noFill/>
+              </a:ln>
+              <a:effectLst/>
+              <a:uLnTx/>
+              <a:uFillTx/>
+              <a:latin typeface="Arial" pitchFamily="34" charset="0"/>
+              <a:cs typeface="Arial" pitchFamily="34" charset="0"/>
+            </a:endParaRPr>
+          </a:p>
+          <a:p>
+            <a:pPr marL="0" marR="0" lvl="0" indent="0" defTabSz="914400" rtl="0" eaLnBrk="1" fontAlgn="auto" latinLnBrk="0" hangingPunct="1">
+              <a:lnSpc>
+                <a:spcPct val="200000"/>
+              </a:lnSpc>
+              <a:spcBef>
+                <a:spcPct val="20000"/>
+              </a:spcBef>
+              <a:spcAft>
+                <a:spcPts val="0"/>
+              </a:spcAft>
+              <a:buClrTx/>
+              <a:buSzTx/>
+              <a:buFont typeface="Arial" pitchFamily="34" charset="0"/>
+              <a:buNone/>
+              <a:tabLst/>
+              <a:defRPr/>
+            </a:pPr>
+            <a:endParaRPr kumimoji="0" lang="pt-PT" sz="2000" b="0" i="0" u="none" strike="noStrike" kern="1200" cap="none" spc="0" normalizeH="0" baseline="0" noProof="0" dirty="0">
+              <a:ln>
+                <a:noFill/>
+              </a:ln>
+              <a:effectLst/>
+              <a:uLnTx/>
+              <a:uFillTx/>
+              <a:latin typeface="Arial" pitchFamily="34" charset="0"/>
+              <a:cs typeface="Arial" pitchFamily="34" charset="0"/>
+            </a:endParaRPr>
+          </a:p>
+          <a:p>
+            <a:pPr marL="0" marR="0" lvl="0" indent="0" defTabSz="914400" rtl="0" eaLnBrk="1" fontAlgn="auto" latinLnBrk="0" hangingPunct="1">
+              <a:lnSpc>
+                <a:spcPct val="200000"/>
+              </a:lnSpc>
+              <a:spcBef>
+                <a:spcPct val="20000"/>
+              </a:spcBef>
+              <a:spcAft>
+                <a:spcPts val="0"/>
+              </a:spcAft>
+              <a:buClrTx/>
+              <a:buSzTx/>
+              <a:buFont typeface="Arial" pitchFamily="34" charset="0"/>
+              <a:buNone/>
+              <a:tabLst/>
+              <a:defRPr/>
+            </a:pPr>
+            <a:endParaRPr kumimoji="0" lang="pt-PT" sz="2000" b="0" i="0" u="none" strike="noStrike" kern="1200" cap="none" spc="0" normalizeH="0" baseline="0" noProof="0" dirty="0">
+              <a:ln>
+                <a:noFill/>
+              </a:ln>
+              <a:effectLst/>
+              <a:uLnTx/>
+              <a:uFillTx/>
+              <a:latin typeface="Arial" pitchFamily="34" charset="0"/>
+              <a:cs typeface="Arial" pitchFamily="34" charset="0"/>
+            </a:endParaRPr>
+          </a:p>
+        </p:txBody>
+      </p:sp>
+      <p:pic>
+        <p:nvPicPr>
+          <p:cNvPr id="7" name="Imagem 6">
+            <a:extLst>
+              <a:ext uri="{FF2B5EF4-FFF2-40B4-BE49-F238E27FC236}">
+                <a16:creationId xmlns:a16="http://schemas.microsoft.com/office/drawing/2014/main" id="{54D42837-E70D-4C64-A8A7-E7F751502B92}"/>
+              </a:ext>
+            </a:extLst>
+          </p:cNvPr>
+          <p:cNvPicPr>
+            <a:picLocks noChangeAspect="1"/>
+          </p:cNvPicPr>
+          <p:nvPr/>
+        </p:nvPicPr>
+        <p:blipFill>
+          <a:blip r:embed="rId3"/>
+          <a:stretch>
+            <a:fillRect/>
+          </a:stretch>
+        </p:blipFill>
+        <p:spPr>
+          <a:xfrm>
+            <a:off x="101225" y="904241"/>
+            <a:ext cx="9014192" cy="266482"/>
+          </a:xfrm>
+          <a:prstGeom prst="rect">
+            <a:avLst/>
+          </a:prstGeom>
+        </p:spPr>
+      </p:pic>
+      <p:pic>
+        <p:nvPicPr>
+          <p:cNvPr id="9" name="Imagem 8">
+            <a:extLst>
+              <a:ext uri="{FF2B5EF4-FFF2-40B4-BE49-F238E27FC236}">
+                <a16:creationId xmlns:a16="http://schemas.microsoft.com/office/drawing/2014/main" id="{81982921-1900-46B5-BE82-07BECCD63918}"/>
+              </a:ext>
+            </a:extLst>
+          </p:cNvPr>
+          <p:cNvPicPr>
+            <a:picLocks noChangeAspect="1"/>
+          </p:cNvPicPr>
+          <p:nvPr/>
+        </p:nvPicPr>
+        <p:blipFill>
+          <a:blip r:embed="rId4"/>
+          <a:stretch>
+            <a:fillRect/>
+          </a:stretch>
+        </p:blipFill>
+        <p:spPr>
+          <a:xfrm>
+            <a:off x="0" y="6320212"/>
+            <a:ext cx="9144000" cy="253252"/>
+          </a:xfrm>
+          <a:prstGeom prst="rect">
+            <a:avLst/>
+          </a:prstGeom>
+        </p:spPr>
+      </p:pic>
+      <p:pic>
+        <p:nvPicPr>
+          <p:cNvPr id="13" name="Imagem 12">
+            <a:extLst>
+              <a:ext uri="{FF2B5EF4-FFF2-40B4-BE49-F238E27FC236}">
+                <a16:creationId xmlns:a16="http://schemas.microsoft.com/office/drawing/2014/main" id="{BE263CB9-5E3B-4385-9450-974CDF0F6C7D}"/>
+              </a:ext>
+            </a:extLst>
+          </p:cNvPr>
+          <p:cNvPicPr>
+            <a:picLocks noChangeAspect="1"/>
+          </p:cNvPicPr>
+          <p:nvPr/>
+        </p:nvPicPr>
+        <p:blipFill>
+          <a:blip r:embed="rId5" cstate="print">
+            <a:extLst>
+              <a:ext uri="{28A0092B-C50C-407E-A947-70E740481C1C}">
+                <a14:useLocalDpi xmlns:a14="http://schemas.microsoft.com/office/drawing/2010/main" val="0"/>
+              </a:ext>
+            </a:extLst>
+          </a:blip>
+          <a:stretch>
+            <a:fillRect/>
+          </a:stretch>
+        </p:blipFill>
+        <p:spPr>
+          <a:xfrm>
+            <a:off x="238125" y="6488336"/>
+            <a:ext cx="545959" cy="199802"/>
+          </a:xfrm>
+          <a:prstGeom prst="rect">
+            <a:avLst/>
+          </a:prstGeom>
+        </p:spPr>
+      </p:pic>
+      <p:sp>
+        <p:nvSpPr>
+          <p:cNvPr id="3" name="Rectângulo 19">
+            <a:extLst>
+              <a:ext uri="{FF2B5EF4-FFF2-40B4-BE49-F238E27FC236}">
+                <a16:creationId xmlns:a16="http://schemas.microsoft.com/office/drawing/2014/main" id="{850208AF-C5A5-C009-177D-8C27BB5DCC8B}"/>
+              </a:ext>
+            </a:extLst>
+          </p:cNvPr>
+          <p:cNvSpPr/>
+          <p:nvPr/>
+        </p:nvSpPr>
+        <p:spPr>
+          <a:xfrm>
+            <a:off x="5535613" y="553019"/>
+            <a:ext cx="3505200" cy="261610"/>
+          </a:xfrm>
+          <a:prstGeom prst="rect">
+            <a:avLst/>
+          </a:prstGeom>
+        </p:spPr>
+        <p:txBody>
+          <a:bodyPr wrap="square">
+            <a:spAutoFit/>
+          </a:bodyPr>
+          <a:lstStyle/>
+          <a:p>
+            <a:pPr algn="r"/>
+            <a:r>
+              <a:rPr lang="pt-PT" sz="1100" b="1" cap="all" dirty="0" err="1">
+                <a:highlight>
+                  <a:srgbClr val="FFFF00"/>
+                </a:highlight>
+              </a:rPr>
+              <a:t>Degree</a:t>
+            </a:r>
+            <a:r>
+              <a:rPr lang="pt-PT" sz="1100" b="1" cap="all" dirty="0">
+                <a:highlight>
+                  <a:srgbClr val="FFFF00"/>
+                </a:highlight>
+              </a:rPr>
+              <a:t> IN </a:t>
+            </a:r>
+            <a:r>
+              <a:rPr lang="pt-PT" sz="1100" b="1" cap="all" dirty="0" err="1">
+                <a:highlight>
+                  <a:srgbClr val="FFFF00"/>
+                </a:highlight>
+              </a:rPr>
+              <a:t>Informatics</a:t>
+            </a:r>
+            <a:r>
+              <a:rPr lang="pt-PT" sz="1100" b="1" cap="all" dirty="0">
+                <a:highlight>
+                  <a:srgbClr val="FFFF00"/>
+                </a:highlight>
+              </a:rPr>
+              <a:t> </a:t>
+            </a:r>
+            <a:r>
+              <a:rPr lang="pt-PT" sz="1100" b="1" cap="all" dirty="0" err="1">
+                <a:highlight>
+                  <a:srgbClr val="FFFF00"/>
+                </a:highlight>
+              </a:rPr>
+              <a:t>engineering</a:t>
+            </a:r>
+            <a:endParaRPr lang="pt-PT" sz="1100" dirty="0">
+              <a:highlight>
+                <a:srgbClr val="FFFF00"/>
+              </a:highlight>
+            </a:endParaRPr>
+          </a:p>
+        </p:txBody>
+      </p:sp>
+      <p:pic>
+        <p:nvPicPr>
+          <p:cNvPr id="5" name="Imagem 4">
+            <a:extLst>
+              <a:ext uri="{FF2B5EF4-FFF2-40B4-BE49-F238E27FC236}">
+                <a16:creationId xmlns:a16="http://schemas.microsoft.com/office/drawing/2014/main" id="{4B69841B-4743-42E9-837A-73B87FC5C8CF}"/>
+              </a:ext>
+            </a:extLst>
+          </p:cNvPr>
+          <p:cNvPicPr>
+            <a:picLocks noChangeAspect="1"/>
+          </p:cNvPicPr>
+          <p:nvPr/>
+        </p:nvPicPr>
+        <p:blipFill>
+          <a:blip r:embed="rId6" cstate="print">
+            <a:extLst>
+              <a:ext uri="{28A0092B-C50C-407E-A947-70E740481C1C}">
+                <a14:useLocalDpi xmlns:a14="http://schemas.microsoft.com/office/drawing/2010/main" val="0"/>
+              </a:ext>
+            </a:extLst>
+          </a:blip>
+          <a:stretch>
+            <a:fillRect/>
+          </a:stretch>
+        </p:blipFill>
+        <p:spPr>
+          <a:xfrm>
+            <a:off x="6575316" y="9186"/>
+            <a:ext cx="2575034" cy="639880"/>
+          </a:xfrm>
+          <a:prstGeom prst="rect">
+            <a:avLst/>
+          </a:prstGeom>
+        </p:spPr>
+      </p:pic>
+      <p:sp>
+        <p:nvSpPr>
+          <p:cNvPr id="4" name="Subtítulo 2">
+            <a:extLst>
+              <a:ext uri="{FF2B5EF4-FFF2-40B4-BE49-F238E27FC236}">
+                <a16:creationId xmlns:a16="http://schemas.microsoft.com/office/drawing/2014/main" id="{0F443CA8-A853-9EB3-2038-4F6563C023F0}"/>
+              </a:ext>
+            </a:extLst>
+          </p:cNvPr>
+          <p:cNvSpPr txBox="1">
+            <a:spLocks/>
+          </p:cNvSpPr>
+          <p:nvPr/>
+        </p:nvSpPr>
+        <p:spPr>
+          <a:xfrm>
+            <a:off x="836017" y="6524516"/>
+            <a:ext cx="7698382" cy="162409"/>
+          </a:xfrm>
+          <a:prstGeom prst="rect">
+            <a:avLst/>
+          </a:prstGeom>
+        </p:spPr>
+        <p:txBody>
+          <a:bodyPr vert="horz" lIns="68580" tIns="34290" rIns="68580" bIns="34290" rtlCol="0">
+            <a:normAutofit fontScale="92500" lnSpcReduction="20000"/>
+          </a:bodyPr>
+          <a:lstStyle>
+            <a:lvl1pPr marL="0" indent="0" algn="ctr" defTabSz="914400" rtl="0" eaLnBrk="1" latinLnBrk="0" hangingPunct="1">
+              <a:lnSpc>
+                <a:spcPct val="90000"/>
+              </a:lnSpc>
+              <a:spcBef>
+                <a:spcPts val="1000"/>
+              </a:spcBef>
+              <a:buFont typeface="Arial" panose="020B0604020202020204" pitchFamily="34" charset="0"/>
+              <a:buNone/>
+              <a:defRPr sz="2400" kern="1200">
+                <a:solidFill>
+                  <a:schemeClr val="tx1"/>
+                </a:solidFill>
+                <a:latin typeface="+mn-lt"/>
+                <a:ea typeface="+mn-ea"/>
+                <a:cs typeface="+mn-cs"/>
+              </a:defRPr>
+            </a:lvl1pPr>
+            <a:lvl2pPr marL="457200" indent="0" algn="ctr" defTabSz="914400" rtl="0" eaLnBrk="1" latinLnBrk="0" hangingPunct="1">
+              <a:lnSpc>
+                <a:spcPct val="90000"/>
+              </a:lnSpc>
+              <a:spcBef>
+                <a:spcPts val="500"/>
+              </a:spcBef>
+              <a:buFont typeface="Arial" panose="020B0604020202020204" pitchFamily="34" charset="0"/>
+              <a:buNone/>
+              <a:defRPr sz="2000" kern="1200">
+                <a:solidFill>
+                  <a:schemeClr val="tx1"/>
+                </a:solidFill>
+                <a:latin typeface="+mn-lt"/>
+                <a:ea typeface="+mn-ea"/>
+                <a:cs typeface="+mn-cs"/>
+              </a:defRPr>
+            </a:lvl2pPr>
+            <a:lvl3pPr marL="914400" indent="0" algn="ctr" defTabSz="914400" rtl="0" eaLnBrk="1" latinLnBrk="0" hangingPunct="1">
+              <a:lnSpc>
+                <a:spcPct val="90000"/>
+              </a:lnSpc>
+              <a:spcBef>
+                <a:spcPts val="500"/>
+              </a:spcBef>
+              <a:buFont typeface="Arial" panose="020B0604020202020204" pitchFamily="34" charset="0"/>
+              <a:buNone/>
+              <a:defRPr sz="1800" kern="1200">
+                <a:solidFill>
+                  <a:schemeClr val="tx1"/>
+                </a:solidFill>
+                <a:latin typeface="+mn-lt"/>
+                <a:ea typeface="+mn-ea"/>
+                <a:cs typeface="+mn-cs"/>
+              </a:defRPr>
+            </a:lvl3pPr>
+            <a:lvl4pPr marL="1371600" indent="0" algn="ctr" defTabSz="914400" rtl="0" eaLnBrk="1" latinLnBrk="0" hangingPunct="1">
+              <a:lnSpc>
+                <a:spcPct val="90000"/>
+              </a:lnSpc>
+              <a:spcBef>
+                <a:spcPts val="500"/>
+              </a:spcBef>
+              <a:buFont typeface="Arial" panose="020B0604020202020204" pitchFamily="34" charset="0"/>
+              <a:buNone/>
+              <a:defRPr sz="1600" kern="1200">
+                <a:solidFill>
+                  <a:schemeClr val="tx1"/>
+                </a:solidFill>
+                <a:latin typeface="+mn-lt"/>
+                <a:ea typeface="+mn-ea"/>
+                <a:cs typeface="+mn-cs"/>
+              </a:defRPr>
+            </a:lvl4pPr>
+            <a:lvl5pPr marL="1828800" indent="0" algn="ctr" defTabSz="914400" rtl="0" eaLnBrk="1" latinLnBrk="0" hangingPunct="1">
+              <a:lnSpc>
+                <a:spcPct val="90000"/>
+              </a:lnSpc>
+              <a:spcBef>
+                <a:spcPts val="500"/>
+              </a:spcBef>
+              <a:buFont typeface="Arial" panose="020B0604020202020204" pitchFamily="34" charset="0"/>
+              <a:buNone/>
+              <a:defRPr sz="1600" kern="1200">
+                <a:solidFill>
+                  <a:schemeClr val="tx1"/>
+                </a:solidFill>
+                <a:latin typeface="+mn-lt"/>
+                <a:ea typeface="+mn-ea"/>
+                <a:cs typeface="+mn-cs"/>
+              </a:defRPr>
+            </a:lvl5pPr>
+            <a:lvl6pPr marL="2286000" indent="0" algn="ctr" defTabSz="914400" rtl="0" eaLnBrk="1" latinLnBrk="0" hangingPunct="1">
+              <a:lnSpc>
+                <a:spcPct val="90000"/>
+              </a:lnSpc>
+              <a:spcBef>
+                <a:spcPts val="500"/>
+              </a:spcBef>
+              <a:buFont typeface="Arial" panose="020B0604020202020204" pitchFamily="34" charset="0"/>
+              <a:buNone/>
+              <a:defRPr sz="1600" kern="1200">
+                <a:solidFill>
+                  <a:schemeClr val="tx1"/>
+                </a:solidFill>
+                <a:latin typeface="+mn-lt"/>
+                <a:ea typeface="+mn-ea"/>
+                <a:cs typeface="+mn-cs"/>
+              </a:defRPr>
+            </a:lvl6pPr>
+            <a:lvl7pPr marL="2743200" indent="0" algn="ctr" defTabSz="914400" rtl="0" eaLnBrk="1" latinLnBrk="0" hangingPunct="1">
+              <a:lnSpc>
+                <a:spcPct val="90000"/>
+              </a:lnSpc>
+              <a:spcBef>
+                <a:spcPts val="500"/>
+              </a:spcBef>
+              <a:buFont typeface="Arial" panose="020B0604020202020204" pitchFamily="34" charset="0"/>
+              <a:buNone/>
+              <a:defRPr sz="1600" kern="1200">
+                <a:solidFill>
+                  <a:schemeClr val="tx1"/>
+                </a:solidFill>
+                <a:latin typeface="+mn-lt"/>
+                <a:ea typeface="+mn-ea"/>
+                <a:cs typeface="+mn-cs"/>
+              </a:defRPr>
+            </a:lvl7pPr>
+            <a:lvl8pPr marL="3200400" indent="0" algn="ctr" defTabSz="914400" rtl="0" eaLnBrk="1" latinLnBrk="0" hangingPunct="1">
+              <a:lnSpc>
+                <a:spcPct val="90000"/>
+              </a:lnSpc>
+              <a:spcBef>
+                <a:spcPts val="500"/>
+              </a:spcBef>
+              <a:buFont typeface="Arial" panose="020B0604020202020204" pitchFamily="34" charset="0"/>
+              <a:buNone/>
+              <a:defRPr sz="1600" kern="1200">
+                <a:solidFill>
+                  <a:schemeClr val="tx1"/>
+                </a:solidFill>
+                <a:latin typeface="+mn-lt"/>
+                <a:ea typeface="+mn-ea"/>
+                <a:cs typeface="+mn-cs"/>
+              </a:defRPr>
+            </a:lvl8pPr>
+            <a:lvl9pPr marL="3657600" indent="0" algn="ctr" defTabSz="914400" rtl="0" eaLnBrk="1" latinLnBrk="0" hangingPunct="1">
+              <a:lnSpc>
+                <a:spcPct val="90000"/>
+              </a:lnSpc>
+              <a:spcBef>
+                <a:spcPts val="500"/>
+              </a:spcBef>
+              <a:buFont typeface="Arial" panose="020B0604020202020204" pitchFamily="34" charset="0"/>
+              <a:buNone/>
+              <a:defRPr sz="1600" kern="1200">
+                <a:solidFill>
+                  <a:schemeClr val="tx1"/>
+                </a:solidFill>
+                <a:latin typeface="+mn-lt"/>
+                <a:ea typeface="+mn-ea"/>
+                <a:cs typeface="+mn-cs"/>
+              </a:defRPr>
+            </a:lvl9pPr>
+          </a:lstStyle>
+          <a:p>
+            <a:pPr algn="l"/>
+            <a:r>
+              <a:rPr lang="pt-PT" sz="900" dirty="0">
+                <a:latin typeface="Arial" charset="0"/>
+                <a:ea typeface="Arial" charset="0"/>
+                <a:cs typeface="Arial" charset="0"/>
+              </a:rPr>
+              <a:t>@Diogo Reis, Diogo Pinheiro| </a:t>
+            </a:r>
+            <a:r>
+              <a:rPr lang="pt-PT" sz="900" b="1" dirty="0">
+                <a:solidFill>
+                  <a:srgbClr val="C00000"/>
+                </a:solidFill>
+                <a:latin typeface="Arial" charset="0"/>
+                <a:ea typeface="Arial" charset="0"/>
+                <a:cs typeface="Arial" charset="0"/>
+              </a:rPr>
+              <a:t>Unidade Curricular: INTEGRAÇÃO DE SISTEMAS </a:t>
+            </a:r>
+            <a:r>
+              <a:rPr lang="pt-PT" sz="900" dirty="0">
+                <a:latin typeface="Arial" charset="0"/>
+                <a:ea typeface="Arial" charset="0"/>
+                <a:cs typeface="Arial" charset="0"/>
+              </a:rPr>
+              <a:t>– Ano Letivo 2023/2024 – </a:t>
+            </a:r>
+            <a:r>
+              <a:rPr lang="pt-PT" sz="900" b="1" dirty="0">
+                <a:latin typeface="Arial" charset="0"/>
+                <a:ea typeface="Arial" charset="0"/>
+                <a:cs typeface="Arial" charset="0"/>
+              </a:rPr>
+              <a:t>Trabalho Prático</a:t>
+            </a:r>
+          </a:p>
+        </p:txBody>
+      </p:sp>
+      <p:pic>
+        <p:nvPicPr>
+          <p:cNvPr id="10" name="Imagem 9">
+            <a:extLst>
+              <a:ext uri="{FF2B5EF4-FFF2-40B4-BE49-F238E27FC236}">
+                <a16:creationId xmlns:a16="http://schemas.microsoft.com/office/drawing/2014/main" id="{9E73DF30-6020-5A82-1059-71A1C2BC870C}"/>
+              </a:ext>
+            </a:extLst>
+          </p:cNvPr>
+          <p:cNvPicPr>
+            <a:picLocks noChangeAspect="1"/>
+          </p:cNvPicPr>
+          <p:nvPr/>
+        </p:nvPicPr>
+        <p:blipFill rotWithShape="1">
+          <a:blip r:embed="rId7"/>
+          <a:srcRect l="2104" r="8638"/>
+          <a:stretch/>
+        </p:blipFill>
+        <p:spPr>
+          <a:xfrm>
+            <a:off x="3676644" y="1872270"/>
+            <a:ext cx="5162556" cy="3752831"/>
+          </a:xfrm>
+          <a:prstGeom prst="rect">
+            <a:avLst/>
+          </a:prstGeom>
+        </p:spPr>
+      </p:pic>
+    </p:spTree>
+    <p:extLst>
+      <p:ext uri="{BB962C8B-B14F-4D97-AF65-F5344CB8AC3E}">
+        <p14:creationId xmlns:p14="http://schemas.microsoft.com/office/powerpoint/2010/main" val="2447269468"/>
+      </p:ext>
+    </p:extLst>
+  </p:cSld>
+  <p:clrMapOvr>
+    <a:masterClrMapping/>
+  </p:clrMapOvr>
+</p:sld>
+</file>
+
+<file path=ppt/slides/slide7.xml><?xml version="1.0" encoding="utf-8"?>
 <p:sld xmlns:a="http://schemas.openxmlformats.org/drawingml/2006/main" xmlns:r="http://schemas.openxmlformats.org/officeDocument/2006/relationships" xmlns:p="http://schemas.openxmlformats.org/presentationml/2006/main">
   <p:cSld>
     <p:spTree>
@@ -7836,7 +11171,7 @@
             <a:fld id="{1234D2FF-8FB9-47A1-B8C9-42A5F500BA2F}" type="slidenum">
               <a:rPr lang="pt-PT" sz="1000"/>
               <a:pPr algn="ctr"/>
-              <a:t>4</a:t>
+              <a:t>7</a:t>
             </a:fld>
             <a:r>
               <a:rPr lang="pt-PT" sz="1000" dirty="0"/>
@@ -8251,7 +11586,7 @@
 </p:sld>
 </file>
 
-<file path=ppt/slides/slide5.xml><?xml version="1.0" encoding="utf-8"?>
+<file path=ppt/slides/slide8.xml><?xml version="1.0" encoding="utf-8"?>
 <p:sld xmlns:a="http://schemas.openxmlformats.org/drawingml/2006/main" xmlns:r="http://schemas.openxmlformats.org/officeDocument/2006/relationships" xmlns:p="http://schemas.openxmlformats.org/presentationml/2006/main">
   <p:cSld>
     <p:spTree>
@@ -8693,7 +12028,7 @@
             <a:fld id="{1234D2FF-8FB9-47A1-B8C9-42A5F500BA2F}" type="slidenum">
               <a:rPr lang="pt-PT" sz="1000"/>
               <a:pPr algn="ctr"/>
-              <a:t>5</a:t>
+              <a:t>8</a:t>
             </a:fld>
             <a:r>
               <a:rPr lang="pt-PT" sz="1000" dirty="0"/>
@@ -9218,7 +12553,7 @@
 </p:sld>
 </file>
 
-<file path=ppt/slides/slide6.xml><?xml version="1.0" encoding="utf-8"?>
+<file path=ppt/slides/slide9.xml><?xml version="1.0" encoding="utf-8"?>
 <p:sld xmlns:a="http://schemas.openxmlformats.org/drawingml/2006/main" xmlns:r="http://schemas.openxmlformats.org/officeDocument/2006/relationships" xmlns:p="http://schemas.openxmlformats.org/presentationml/2006/main">
   <p:cSld>
     <p:spTree>

</xml_diff>